<commit_message>
added pictures showing basic data flow
</commit_message>
<xml_diff>
--- a/doc/Praesentation_Meeting_13.06.2017.pptx
+++ b/doc/Praesentation_Meeting_13.06.2017.pptx
@@ -146,6 +146,36 @@
       </a:defRPr>
     </a:lvl9pPr>
   </p:defaultTextStyle>
+  <p:extLst>
+    <p:ext uri="{EFAFB233-063F-42B5-8137-9DF3F51BA10A}">
+      <p15:sldGuideLst xmlns:p15="http://schemas.microsoft.com/office/powerpoint/2012/main">
+        <p15:guide id="1" orient="horz">
+          <p15:clr>
+            <a:srgbClr val="A4A3A4"/>
+          </p15:clr>
+        </p15:guide>
+        <p15:guide id="2" pos="1091">
+          <p15:clr>
+            <a:srgbClr val="A4A3A4"/>
+          </p15:clr>
+        </p15:guide>
+      </p15:sldGuideLst>
+    </p:ext>
+    <p:ext uri="{2D200454-40CA-4A62-9FC3-DE9A4176ACB9}">
+      <p15:notesGuideLst xmlns:p15="http://schemas.microsoft.com/office/powerpoint/2012/main">
+        <p15:guide id="1" orient="horz" pos="2140">
+          <p15:clr>
+            <a:srgbClr val="A4A3A4"/>
+          </p15:clr>
+        </p15:guide>
+        <p15:guide id="2" pos="3127">
+          <p15:clr>
+            <a:srgbClr val="A4A3A4"/>
+          </p15:clr>
+        </p15:guide>
+      </p15:notesGuideLst>
+    </p:ext>
+  </p:extLst>
 </p:presentation>
 </file>
 
@@ -199,14 +229,14 @@
           <a:effectLst/>
           <a:extLst>
             <a:ext uri="{909E8E84-426E-40DD-AFC4-6F175D3DCCD1}">
-              <a14:hiddenFill xmlns:a14="http://schemas.microsoft.com/office/drawing/2010/main" xmlns="">
+              <a14:hiddenFill xmlns:a14="http://schemas.microsoft.com/office/drawing/2010/main">
                 <a:solidFill>
                   <a:schemeClr val="accent1"/>
                 </a:solidFill>
               </a14:hiddenFill>
             </a:ext>
             <a:ext uri="{91240B29-F687-4F45-9708-019B960494DF}">
-              <a14:hiddenLine xmlns:a14="http://schemas.microsoft.com/office/drawing/2010/main" xmlns="" w="9525">
+              <a14:hiddenLine xmlns:a14="http://schemas.microsoft.com/office/drawing/2010/main" w="9525">
                 <a:solidFill>
                   <a:schemeClr val="tx1"/>
                 </a:solidFill>
@@ -216,7 +246,7 @@
               </a14:hiddenLine>
             </a:ext>
             <a:ext uri="{AF507438-7753-43E0-B8FC-AC1667EBCBE1}">
-              <a14:hiddenEffects xmlns:a14="http://schemas.microsoft.com/office/drawing/2010/main" xmlns="">
+              <a14:hiddenEffects xmlns:a14="http://schemas.microsoft.com/office/drawing/2010/main">
                 <a:effectLst>
                   <a:outerShdw dist="35921" dir="2700000" algn="ctr" rotWithShape="0">
                     <a:schemeClr val="bg2"/>
@@ -270,14 +300,14 @@
           <a:effectLst/>
           <a:extLst>
             <a:ext uri="{909E8E84-426E-40DD-AFC4-6F175D3DCCD1}">
-              <a14:hiddenFill xmlns:a14="http://schemas.microsoft.com/office/drawing/2010/main" xmlns="">
+              <a14:hiddenFill xmlns:a14="http://schemas.microsoft.com/office/drawing/2010/main">
                 <a:solidFill>
                   <a:schemeClr val="accent1"/>
                 </a:solidFill>
               </a14:hiddenFill>
             </a:ext>
             <a:ext uri="{91240B29-F687-4F45-9708-019B960494DF}">
-              <a14:hiddenLine xmlns:a14="http://schemas.microsoft.com/office/drawing/2010/main" xmlns="" w="9525">
+              <a14:hiddenLine xmlns:a14="http://schemas.microsoft.com/office/drawing/2010/main" w="9525">
                 <a:solidFill>
                   <a:schemeClr val="tx1"/>
                 </a:solidFill>
@@ -287,7 +317,7 @@
               </a14:hiddenLine>
             </a:ext>
             <a:ext uri="{AF507438-7753-43E0-B8FC-AC1667EBCBE1}">
-              <a14:hiddenEffects xmlns:a14="http://schemas.microsoft.com/office/drawing/2010/main" xmlns="">
+              <a14:hiddenEffects xmlns:a14="http://schemas.microsoft.com/office/drawing/2010/main">
                 <a:effectLst>
                   <a:outerShdw dist="35921" dir="2700000" algn="ctr" rotWithShape="0">
                     <a:schemeClr val="bg2"/>
@@ -341,14 +371,14 @@
           <a:effectLst/>
           <a:extLst>
             <a:ext uri="{909E8E84-426E-40DD-AFC4-6F175D3DCCD1}">
-              <a14:hiddenFill xmlns:a14="http://schemas.microsoft.com/office/drawing/2010/main" xmlns="">
+              <a14:hiddenFill xmlns:a14="http://schemas.microsoft.com/office/drawing/2010/main">
                 <a:solidFill>
                   <a:schemeClr val="accent1"/>
                 </a:solidFill>
               </a14:hiddenFill>
             </a:ext>
             <a:ext uri="{91240B29-F687-4F45-9708-019B960494DF}">
-              <a14:hiddenLine xmlns:a14="http://schemas.microsoft.com/office/drawing/2010/main" xmlns="" w="9525">
+              <a14:hiddenLine xmlns:a14="http://schemas.microsoft.com/office/drawing/2010/main" w="9525">
                 <a:solidFill>
                   <a:schemeClr val="tx1"/>
                 </a:solidFill>
@@ -358,7 +388,7 @@
               </a14:hiddenLine>
             </a:ext>
             <a:ext uri="{AF507438-7753-43E0-B8FC-AC1667EBCBE1}">
-              <a14:hiddenEffects xmlns:a14="http://schemas.microsoft.com/office/drawing/2010/main" xmlns="">
+              <a14:hiddenEffects xmlns:a14="http://schemas.microsoft.com/office/drawing/2010/main">
                 <a:effectLst>
                   <a:outerShdw dist="35921" dir="2700000" algn="ctr" rotWithShape="0">
                     <a:schemeClr val="bg2"/>
@@ -412,14 +442,14 @@
           <a:effectLst/>
           <a:extLst>
             <a:ext uri="{909E8E84-426E-40DD-AFC4-6F175D3DCCD1}">
-              <a14:hiddenFill xmlns:a14="http://schemas.microsoft.com/office/drawing/2010/main" xmlns="">
+              <a14:hiddenFill xmlns:a14="http://schemas.microsoft.com/office/drawing/2010/main">
                 <a:solidFill>
                   <a:schemeClr val="accent1"/>
                 </a:solidFill>
               </a14:hiddenFill>
             </a:ext>
             <a:ext uri="{91240B29-F687-4F45-9708-019B960494DF}">
-              <a14:hiddenLine xmlns:a14="http://schemas.microsoft.com/office/drawing/2010/main" xmlns="" w="9525">
+              <a14:hiddenLine xmlns:a14="http://schemas.microsoft.com/office/drawing/2010/main" w="9525">
                 <a:solidFill>
                   <a:schemeClr val="tx1"/>
                 </a:solidFill>
@@ -429,7 +459,7 @@
               </a14:hiddenLine>
             </a:ext>
             <a:ext uri="{AF507438-7753-43E0-B8FC-AC1667EBCBE1}">
-              <a14:hiddenEffects xmlns:a14="http://schemas.microsoft.com/office/drawing/2010/main" xmlns="">
+              <a14:hiddenEffects xmlns:a14="http://schemas.microsoft.com/office/drawing/2010/main">
                 <a:effectLst>
                   <a:outerShdw dist="35921" dir="2700000" algn="ctr" rotWithShape="0">
                     <a:schemeClr val="bg2"/>
@@ -468,7 +498,7 @@
     </p:spTree>
     <p:extLst>
       <p:ext uri="{BB962C8B-B14F-4D97-AF65-F5344CB8AC3E}">
-        <p14:creationId xmlns:p14="http://schemas.microsoft.com/office/powerpoint/2010/main" xmlns="" val="1669010643"/>
+        <p14:creationId xmlns:p14="http://schemas.microsoft.com/office/powerpoint/2010/main" val="1669010643"/>
       </p:ext>
     </p:extLst>
   </p:cSld>
@@ -526,14 +556,14 @@
           <a:effectLst/>
           <a:extLst>
             <a:ext uri="{909E8E84-426E-40DD-AFC4-6F175D3DCCD1}">
-              <a14:hiddenFill xmlns:a14="http://schemas.microsoft.com/office/drawing/2010/main" xmlns="">
+              <a14:hiddenFill xmlns:a14="http://schemas.microsoft.com/office/drawing/2010/main">
                 <a:solidFill>
                   <a:schemeClr val="accent1"/>
                 </a:solidFill>
               </a14:hiddenFill>
             </a:ext>
             <a:ext uri="{91240B29-F687-4F45-9708-019B960494DF}">
-              <a14:hiddenLine xmlns:a14="http://schemas.microsoft.com/office/drawing/2010/main" xmlns="" w="9525">
+              <a14:hiddenLine xmlns:a14="http://schemas.microsoft.com/office/drawing/2010/main" w="9525">
                 <a:solidFill>
                   <a:schemeClr val="tx1"/>
                 </a:solidFill>
@@ -543,7 +573,7 @@
               </a14:hiddenLine>
             </a:ext>
             <a:ext uri="{AF507438-7753-43E0-B8FC-AC1667EBCBE1}">
-              <a14:hiddenEffects xmlns:a14="http://schemas.microsoft.com/office/drawing/2010/main" xmlns="">
+              <a14:hiddenEffects xmlns:a14="http://schemas.microsoft.com/office/drawing/2010/main">
                 <a:effectLst>
                   <a:outerShdw dist="35921" dir="2700000" algn="ctr" rotWithShape="0">
                     <a:schemeClr val="bg2"/>
@@ -597,14 +627,14 @@
           <a:effectLst/>
           <a:extLst>
             <a:ext uri="{909E8E84-426E-40DD-AFC4-6F175D3DCCD1}">
-              <a14:hiddenFill xmlns:a14="http://schemas.microsoft.com/office/drawing/2010/main" xmlns="">
+              <a14:hiddenFill xmlns:a14="http://schemas.microsoft.com/office/drawing/2010/main">
                 <a:solidFill>
                   <a:schemeClr val="accent1"/>
                 </a:solidFill>
               </a14:hiddenFill>
             </a:ext>
             <a:ext uri="{91240B29-F687-4F45-9708-019B960494DF}">
-              <a14:hiddenLine xmlns:a14="http://schemas.microsoft.com/office/drawing/2010/main" xmlns="" w="9525">
+              <a14:hiddenLine xmlns:a14="http://schemas.microsoft.com/office/drawing/2010/main" w="9525">
                 <a:solidFill>
                   <a:schemeClr val="tx1"/>
                 </a:solidFill>
@@ -614,7 +644,7 @@
               </a14:hiddenLine>
             </a:ext>
             <a:ext uri="{AF507438-7753-43E0-B8FC-AC1667EBCBE1}">
-              <a14:hiddenEffects xmlns:a14="http://schemas.microsoft.com/office/drawing/2010/main" xmlns="">
+              <a14:hiddenEffects xmlns:a14="http://schemas.microsoft.com/office/drawing/2010/main">
                 <a:effectLst>
                   <a:outerShdw dist="35921" dir="2700000" algn="ctr" rotWithShape="0">
                     <a:schemeClr val="bg2"/>
@@ -673,14 +703,14 @@
           <a:effectLst/>
           <a:extLst>
             <a:ext uri="{909E8E84-426E-40DD-AFC4-6F175D3DCCD1}">
-              <a14:hiddenFill xmlns:a14="http://schemas.microsoft.com/office/drawing/2010/main" xmlns="">
+              <a14:hiddenFill xmlns:a14="http://schemas.microsoft.com/office/drawing/2010/main">
                 <a:solidFill>
                   <a:srgbClr val="FFFFFF"/>
                 </a:solidFill>
               </a14:hiddenFill>
             </a:ext>
             <a:ext uri="{AF507438-7753-43E0-B8FC-AC1667EBCBE1}">
-              <a14:hiddenEffects xmlns:a14="http://schemas.microsoft.com/office/drawing/2010/main" xmlns="">
+              <a14:hiddenEffects xmlns:a14="http://schemas.microsoft.com/office/drawing/2010/main">
                 <a:effectLst>
                   <a:outerShdw dist="35921" dir="2700000" algn="ctr" rotWithShape="0">
                     <a:srgbClr val="808080"/>
@@ -689,7 +719,7 @@
               </a14:hiddenEffects>
             </a:ext>
             <a:ext uri="{53640926-AAD7-44D8-BBD7-CCE9431645EC}">
-              <a14:shadowObscured xmlns:a14="http://schemas.microsoft.com/office/drawing/2010/main" xmlns="" val="1"/>
+              <a14:shadowObscured xmlns:a14="http://schemas.microsoft.com/office/drawing/2010/main" val="1"/>
             </a:ext>
           </a:extLst>
         </p:spPr>
@@ -719,14 +749,14 @@
           <a:effectLst/>
           <a:extLst>
             <a:ext uri="{909E8E84-426E-40DD-AFC4-6F175D3DCCD1}">
-              <a14:hiddenFill xmlns:a14="http://schemas.microsoft.com/office/drawing/2010/main" xmlns="">
+              <a14:hiddenFill xmlns:a14="http://schemas.microsoft.com/office/drawing/2010/main">
                 <a:solidFill>
                   <a:schemeClr val="accent1"/>
                 </a:solidFill>
               </a14:hiddenFill>
             </a:ext>
             <a:ext uri="{91240B29-F687-4F45-9708-019B960494DF}">
-              <a14:hiddenLine xmlns:a14="http://schemas.microsoft.com/office/drawing/2010/main" xmlns="" w="9525">
+              <a14:hiddenLine xmlns:a14="http://schemas.microsoft.com/office/drawing/2010/main" w="9525">
                 <a:solidFill>
                   <a:schemeClr val="tx1"/>
                 </a:solidFill>
@@ -736,7 +766,7 @@
               </a14:hiddenLine>
             </a:ext>
             <a:ext uri="{AF507438-7753-43E0-B8FC-AC1667EBCBE1}">
-              <a14:hiddenEffects xmlns:a14="http://schemas.microsoft.com/office/drawing/2010/main" xmlns="">
+              <a14:hiddenEffects xmlns:a14="http://schemas.microsoft.com/office/drawing/2010/main">
                 <a:effectLst>
                   <a:outerShdw dist="35921" dir="2700000" algn="ctr" rotWithShape="0">
                     <a:schemeClr val="bg2"/>
@@ -815,14 +845,14 @@
           <a:effectLst/>
           <a:extLst>
             <a:ext uri="{909E8E84-426E-40DD-AFC4-6F175D3DCCD1}">
-              <a14:hiddenFill xmlns:a14="http://schemas.microsoft.com/office/drawing/2010/main" xmlns="">
+              <a14:hiddenFill xmlns:a14="http://schemas.microsoft.com/office/drawing/2010/main">
                 <a:solidFill>
                   <a:schemeClr val="accent1"/>
                 </a:solidFill>
               </a14:hiddenFill>
             </a:ext>
             <a:ext uri="{91240B29-F687-4F45-9708-019B960494DF}">
-              <a14:hiddenLine xmlns:a14="http://schemas.microsoft.com/office/drawing/2010/main" xmlns="" w="9525">
+              <a14:hiddenLine xmlns:a14="http://schemas.microsoft.com/office/drawing/2010/main" w="9525">
                 <a:solidFill>
                   <a:schemeClr val="tx1"/>
                 </a:solidFill>
@@ -832,7 +862,7 @@
               </a14:hiddenLine>
             </a:ext>
             <a:ext uri="{AF507438-7753-43E0-B8FC-AC1667EBCBE1}">
-              <a14:hiddenEffects xmlns:a14="http://schemas.microsoft.com/office/drawing/2010/main" xmlns="">
+              <a14:hiddenEffects xmlns:a14="http://schemas.microsoft.com/office/drawing/2010/main">
                 <a:effectLst>
                   <a:outerShdw dist="35921" dir="2700000" algn="ctr" rotWithShape="0">
                     <a:schemeClr val="bg2"/>
@@ -886,14 +916,14 @@
           <a:effectLst/>
           <a:extLst>
             <a:ext uri="{909E8E84-426E-40DD-AFC4-6F175D3DCCD1}">
-              <a14:hiddenFill xmlns:a14="http://schemas.microsoft.com/office/drawing/2010/main" xmlns="">
+              <a14:hiddenFill xmlns:a14="http://schemas.microsoft.com/office/drawing/2010/main">
                 <a:solidFill>
                   <a:schemeClr val="accent1"/>
                 </a:solidFill>
               </a14:hiddenFill>
             </a:ext>
             <a:ext uri="{91240B29-F687-4F45-9708-019B960494DF}">
-              <a14:hiddenLine xmlns:a14="http://schemas.microsoft.com/office/drawing/2010/main" xmlns="" w="9525">
+              <a14:hiddenLine xmlns:a14="http://schemas.microsoft.com/office/drawing/2010/main" w="9525">
                 <a:solidFill>
                   <a:schemeClr val="tx1"/>
                 </a:solidFill>
@@ -903,7 +933,7 @@
               </a14:hiddenLine>
             </a:ext>
             <a:ext uri="{AF507438-7753-43E0-B8FC-AC1667EBCBE1}">
-              <a14:hiddenEffects xmlns:a14="http://schemas.microsoft.com/office/drawing/2010/main" xmlns="">
+              <a14:hiddenEffects xmlns:a14="http://schemas.microsoft.com/office/drawing/2010/main">
                 <a:effectLst>
                   <a:outerShdw dist="35921" dir="2700000" algn="ctr" rotWithShape="0">
                     <a:schemeClr val="bg2"/>
@@ -942,7 +972,7 @@
     </p:spTree>
     <p:extLst>
       <p:ext uri="{BB962C8B-B14F-4D97-AF65-F5344CB8AC3E}">
-        <p14:creationId xmlns:p14="http://schemas.microsoft.com/office/powerpoint/2010/main" xmlns="" val="4094411869"/>
+        <p14:creationId xmlns:p14="http://schemas.microsoft.com/office/powerpoint/2010/main" val="4094411869"/>
       </p:ext>
     </p:extLst>
   </p:cSld>
@@ -1101,7 +1131,7 @@
           <a:blip r:embed="rId2" cstate="print">
             <a:extLst>
               <a:ext uri="{28A0092B-C50C-407E-A947-70E740481C1C}">
-                <a14:useLocalDpi xmlns:a14="http://schemas.microsoft.com/office/drawing/2010/main" xmlns="" val="0"/>
+                <a14:useLocalDpi xmlns:a14="http://schemas.microsoft.com/office/drawing/2010/main" val="0"/>
               </a:ext>
             </a:extLst>
           </a:blip>
@@ -1120,7 +1150,7 @@
           <a:noFill/>
           <a:extLst>
             <a:ext uri="{909E8E84-426E-40DD-AFC4-6F175D3DCCD1}">
-              <a14:hiddenFill xmlns:a14="http://schemas.microsoft.com/office/drawing/2010/main" xmlns="">
+              <a14:hiddenFill xmlns:a14="http://schemas.microsoft.com/office/drawing/2010/main">
                 <a:solidFill>
                   <a:srgbClr val="FFFFFF"/>
                 </a:solidFill>
@@ -1141,7 +1171,7 @@
           <a:blip r:embed="rId3" cstate="email">
             <a:extLst>
               <a:ext uri="{28A0092B-C50C-407E-A947-70E740481C1C}">
-                <a14:useLocalDpi xmlns:a14="http://schemas.microsoft.com/office/drawing/2010/main" xmlns=""/>
+                <a14:useLocalDpi xmlns:a14="http://schemas.microsoft.com/office/drawing/2010/main"/>
               </a:ext>
             </a:extLst>
           </a:blip>
@@ -1163,14 +1193,14 @@
           <a:effectLst/>
           <a:extLst>
             <a:ext uri="{909E8E84-426E-40DD-AFC4-6F175D3DCCD1}">
-              <a14:hiddenFill xmlns:a14="http://schemas.microsoft.com/office/drawing/2010/main" xmlns="">
+              <a14:hiddenFill xmlns:a14="http://schemas.microsoft.com/office/drawing/2010/main">
                 <a:solidFill>
                   <a:schemeClr val="accent1"/>
                 </a:solidFill>
               </a14:hiddenFill>
             </a:ext>
             <a:ext uri="{91240B29-F687-4F45-9708-019B960494DF}">
-              <a14:hiddenLine xmlns:a14="http://schemas.microsoft.com/office/drawing/2010/main" xmlns="" w="9525">
+              <a14:hiddenLine xmlns:a14="http://schemas.microsoft.com/office/drawing/2010/main" w="9525">
                 <a:solidFill>
                   <a:schemeClr val="tx1"/>
                 </a:solidFill>
@@ -1180,7 +1210,7 @@
               </a14:hiddenLine>
             </a:ext>
             <a:ext uri="{AF507438-7753-43E0-B8FC-AC1667EBCBE1}">
-              <a14:hiddenEffects xmlns:a14="http://schemas.microsoft.com/office/drawing/2010/main" xmlns="">
+              <a14:hiddenEffects xmlns:a14="http://schemas.microsoft.com/office/drawing/2010/main">
                 <a:effectLst>
                   <a:outerShdw dist="35921" dir="2700000" algn="ctr" rotWithShape="0">
                     <a:schemeClr val="bg2"/>
@@ -1257,14 +1287,14 @@
           <a:noFill/>
           <a:extLst>
             <a:ext uri="{909E8E84-426E-40DD-AFC4-6F175D3DCCD1}">
-              <a14:hiddenFill xmlns:a14="http://schemas.microsoft.com/office/drawing/2010/main" xmlns="">
+              <a14:hiddenFill xmlns:a14="http://schemas.microsoft.com/office/drawing/2010/main">
                 <a:solidFill>
                   <a:schemeClr val="accent1"/>
                 </a:solidFill>
               </a14:hiddenFill>
             </a:ext>
             <a:ext uri="{91240B29-F687-4F45-9708-019B960494DF}">
-              <a14:hiddenLine xmlns:a14="http://schemas.microsoft.com/office/drawing/2010/main" xmlns="" w="9525">
+              <a14:hiddenLine xmlns:a14="http://schemas.microsoft.com/office/drawing/2010/main" w="9525">
                 <a:solidFill>
                   <a:schemeClr val="tx1"/>
                 </a:solidFill>
@@ -1274,7 +1304,7 @@
               </a14:hiddenLine>
             </a:ext>
             <a:ext uri="{AF507438-7753-43E0-B8FC-AC1667EBCBE1}">
-              <a14:hiddenEffects xmlns:a14="http://schemas.microsoft.com/office/drawing/2010/main" xmlns="">
+              <a14:hiddenEffects xmlns:a14="http://schemas.microsoft.com/office/drawing/2010/main">
                 <a:effectLst>
                   <a:outerShdw dist="35921" dir="2700000" algn="ctr" rotWithShape="0">
                     <a:schemeClr val="bg2"/>
@@ -1585,7 +1615,7 @@
           <a:effectLst/>
           <a:extLst>
             <a:ext uri="{91240B29-F687-4F45-9708-019B960494DF}">
-              <a14:hiddenLine xmlns:a14="http://schemas.microsoft.com/office/drawing/2010/main" xmlns="" w="9525">
+              <a14:hiddenLine xmlns:a14="http://schemas.microsoft.com/office/drawing/2010/main" w="9525">
                 <a:solidFill>
                   <a:schemeClr val="tx1"/>
                 </a:solidFill>
@@ -1595,7 +1625,7 @@
               </a14:hiddenLine>
             </a:ext>
             <a:ext uri="{AF507438-7753-43E0-B8FC-AC1667EBCBE1}">
-              <a14:hiddenEffects xmlns:a14="http://schemas.microsoft.com/office/drawing/2010/main" xmlns="">
+              <a14:hiddenEffects xmlns:a14="http://schemas.microsoft.com/office/drawing/2010/main">
                 <a:effectLst>
                   <a:outerShdw dist="35921" dir="2700000" algn="ctr" rotWithShape="0">
                     <a:schemeClr val="bg2"/>
@@ -1803,7 +1833,7 @@
           <a:effectLst/>
           <a:extLst>
             <a:ext uri="{91240B29-F687-4F45-9708-019B960494DF}">
-              <a14:hiddenLine xmlns:a14="http://schemas.microsoft.com/office/drawing/2010/main" xmlns="" w="9525">
+              <a14:hiddenLine xmlns:a14="http://schemas.microsoft.com/office/drawing/2010/main" w="9525">
                 <a:solidFill>
                   <a:schemeClr val="tx1"/>
                 </a:solidFill>
@@ -1813,7 +1843,7 @@
               </a14:hiddenLine>
             </a:ext>
             <a:ext uri="{AF507438-7753-43E0-B8FC-AC1667EBCBE1}">
-              <a14:hiddenEffects xmlns:a14="http://schemas.microsoft.com/office/drawing/2010/main" xmlns="">
+              <a14:hiddenEffects xmlns:a14="http://schemas.microsoft.com/office/drawing/2010/main">
                 <a:effectLst>
                   <a:outerShdw dist="35921" dir="2700000" algn="ctr" rotWithShape="0">
                     <a:schemeClr val="bg2"/>
@@ -1999,7 +2029,7 @@
     </p:spTree>
     <p:extLst>
       <p:ext uri="{BB962C8B-B14F-4D97-AF65-F5344CB8AC3E}">
-        <p14:creationId xmlns:p14="http://schemas.microsoft.com/office/powerpoint/2010/main" xmlns="" val="3997811741"/>
+        <p14:creationId xmlns:p14="http://schemas.microsoft.com/office/powerpoint/2010/main" val="3997811741"/>
       </p:ext>
     </p:extLst>
   </p:cSld>
@@ -2300,7 +2330,7 @@
     </p:spTree>
     <p:extLst>
       <p:ext uri="{BB962C8B-B14F-4D97-AF65-F5344CB8AC3E}">
-        <p14:creationId xmlns:p14="http://schemas.microsoft.com/office/powerpoint/2010/main" xmlns="" val="381220797"/>
+        <p14:creationId xmlns:p14="http://schemas.microsoft.com/office/powerpoint/2010/main" val="381220797"/>
       </p:ext>
     </p:extLst>
   </p:cSld>
@@ -2597,7 +2627,7 @@
     </p:spTree>
     <p:extLst>
       <p:ext uri="{BB962C8B-B14F-4D97-AF65-F5344CB8AC3E}">
-        <p14:creationId xmlns:p14="http://schemas.microsoft.com/office/powerpoint/2010/main" xmlns="" val="740450729"/>
+        <p14:creationId xmlns:p14="http://schemas.microsoft.com/office/powerpoint/2010/main" val="740450729"/>
       </p:ext>
     </p:extLst>
   </p:cSld>
@@ -2894,7 +2924,7 @@
     </p:spTree>
     <p:extLst>
       <p:ext uri="{BB962C8B-B14F-4D97-AF65-F5344CB8AC3E}">
-        <p14:creationId xmlns:p14="http://schemas.microsoft.com/office/powerpoint/2010/main" xmlns="" val="1462842395"/>
+        <p14:creationId xmlns:p14="http://schemas.microsoft.com/office/powerpoint/2010/main" val="1462842395"/>
       </p:ext>
     </p:extLst>
   </p:cSld>
@@ -3121,7 +3151,7 @@
     </p:spTree>
     <p:extLst>
       <p:ext uri="{BB962C8B-B14F-4D97-AF65-F5344CB8AC3E}">
-        <p14:creationId xmlns:p14="http://schemas.microsoft.com/office/powerpoint/2010/main" xmlns="" val="1106715229"/>
+        <p14:creationId xmlns:p14="http://schemas.microsoft.com/office/powerpoint/2010/main" val="1106715229"/>
       </p:ext>
     </p:extLst>
   </p:cSld>
@@ -3441,7 +3471,7 @@
     </p:spTree>
     <p:extLst>
       <p:ext uri="{BB962C8B-B14F-4D97-AF65-F5344CB8AC3E}">
-        <p14:creationId xmlns:p14="http://schemas.microsoft.com/office/powerpoint/2010/main" xmlns="" val="1233670126"/>
+        <p14:creationId xmlns:p14="http://schemas.microsoft.com/office/powerpoint/2010/main" val="1233670126"/>
       </p:ext>
     </p:extLst>
   </p:cSld>
@@ -3523,7 +3553,7 @@
           <a:blip r:embed="rId8" cstate="email">
             <a:extLst>
               <a:ext uri="{28A0092B-C50C-407E-A947-70E740481C1C}">
-                <a14:useLocalDpi xmlns:a14="http://schemas.microsoft.com/office/drawing/2010/main" xmlns=""/>
+                <a14:useLocalDpi xmlns:a14="http://schemas.microsoft.com/office/drawing/2010/main"/>
               </a:ext>
             </a:extLst>
           </a:blip>
@@ -3541,7 +3571,7 @@
           <a:noFill/>
           <a:extLst>
             <a:ext uri="{909E8E84-426E-40DD-AFC4-6F175D3DCCD1}">
-              <a14:hiddenFill xmlns:a14="http://schemas.microsoft.com/office/drawing/2010/main" xmlns="">
+              <a14:hiddenFill xmlns:a14="http://schemas.microsoft.com/office/drawing/2010/main">
                 <a:solidFill>
                   <a:srgbClr val="FFFFFF"/>
                 </a:solidFill>
@@ -3575,14 +3605,14 @@
           <a:effectLst/>
           <a:extLst>
             <a:ext uri="{909E8E84-426E-40DD-AFC4-6F175D3DCCD1}">
-              <a14:hiddenFill xmlns:a14="http://schemas.microsoft.com/office/drawing/2010/main" xmlns="">
+              <a14:hiddenFill xmlns:a14="http://schemas.microsoft.com/office/drawing/2010/main">
                 <a:solidFill>
                   <a:schemeClr val="accent1"/>
                 </a:solidFill>
               </a14:hiddenFill>
             </a:ext>
             <a:ext uri="{91240B29-F687-4F45-9708-019B960494DF}">
-              <a14:hiddenLine xmlns:a14="http://schemas.microsoft.com/office/drawing/2010/main" xmlns="" w="9525">
+              <a14:hiddenLine xmlns:a14="http://schemas.microsoft.com/office/drawing/2010/main" w="9525">
                 <a:solidFill>
                   <a:schemeClr val="tx1"/>
                 </a:solidFill>
@@ -3592,7 +3622,7 @@
               </a14:hiddenLine>
             </a:ext>
             <a:ext uri="{AF507438-7753-43E0-B8FC-AC1667EBCBE1}">
-              <a14:hiddenEffects xmlns:a14="http://schemas.microsoft.com/office/drawing/2010/main" xmlns="">
+              <a14:hiddenEffects xmlns:a14="http://schemas.microsoft.com/office/drawing/2010/main">
                 <a:effectLst>
                   <a:outerShdw dist="35921" dir="2700000" algn="ctr" rotWithShape="0">
                     <a:schemeClr val="bg2"/>
@@ -3655,14 +3685,14 @@
           <a:effectLst/>
           <a:extLst>
             <a:ext uri="{909E8E84-426E-40DD-AFC4-6F175D3DCCD1}">
-              <a14:hiddenFill xmlns:a14="http://schemas.microsoft.com/office/drawing/2010/main" xmlns="">
+              <a14:hiddenFill xmlns:a14="http://schemas.microsoft.com/office/drawing/2010/main">
                 <a:solidFill>
                   <a:schemeClr val="accent1"/>
                 </a:solidFill>
               </a14:hiddenFill>
             </a:ext>
             <a:ext uri="{91240B29-F687-4F45-9708-019B960494DF}">
-              <a14:hiddenLine xmlns:a14="http://schemas.microsoft.com/office/drawing/2010/main" xmlns="" w="9525">
+              <a14:hiddenLine xmlns:a14="http://schemas.microsoft.com/office/drawing/2010/main" w="9525">
                 <a:solidFill>
                   <a:schemeClr val="tx1"/>
                 </a:solidFill>
@@ -3672,7 +3702,7 @@
               </a14:hiddenLine>
             </a:ext>
             <a:ext uri="{AF507438-7753-43E0-B8FC-AC1667EBCBE1}">
-              <a14:hiddenEffects xmlns:a14="http://schemas.microsoft.com/office/drawing/2010/main" xmlns="">
+              <a14:hiddenEffects xmlns:a14="http://schemas.microsoft.com/office/drawing/2010/main">
                 <a:effectLst>
                   <a:outerShdw dist="35921" dir="2700000" algn="ctr" rotWithShape="0">
                     <a:schemeClr val="bg2"/>
@@ -3725,7 +3755,7 @@
           <a:blip r:embed="rId8" cstate="email">
             <a:extLst>
               <a:ext uri="{28A0092B-C50C-407E-A947-70E740481C1C}">
-                <a14:useLocalDpi xmlns:a14="http://schemas.microsoft.com/office/drawing/2010/main" xmlns=""/>
+                <a14:useLocalDpi xmlns:a14="http://schemas.microsoft.com/office/drawing/2010/main"/>
               </a:ext>
             </a:extLst>
           </a:blip>
@@ -3743,7 +3773,7 @@
           <a:noFill/>
           <a:extLst>
             <a:ext uri="{909E8E84-426E-40DD-AFC4-6F175D3DCCD1}">
-              <a14:hiddenFill xmlns:a14="http://schemas.microsoft.com/office/drawing/2010/main" xmlns="">
+              <a14:hiddenFill xmlns:a14="http://schemas.microsoft.com/office/drawing/2010/main">
                 <a:solidFill>
                   <a:srgbClr val="FFFFFF"/>
                 </a:solidFill>
@@ -4289,7 +4319,7 @@
           <a:blip r:embed="rId2" cstate="email">
             <a:extLst>
               <a:ext uri="{28A0092B-C50C-407E-A947-70E740481C1C}">
-                <a14:useLocalDpi xmlns:a14="http://schemas.microsoft.com/office/drawing/2010/main" xmlns=""/>
+                <a14:useLocalDpi xmlns:a14="http://schemas.microsoft.com/office/drawing/2010/main"/>
               </a:ext>
             </a:extLst>
           </a:blip>
@@ -4308,14 +4338,14 @@
           </a:ln>
           <a:extLst>
             <a:ext uri="{909E8E84-426E-40DD-AFC4-6F175D3DCCD1}">
-              <a14:hiddenFill xmlns:a14="http://schemas.microsoft.com/office/drawing/2010/main" xmlns="">
+              <a14:hiddenFill xmlns:a14="http://schemas.microsoft.com/office/drawing/2010/main">
                 <a:solidFill>
                   <a:srgbClr val="FFFFFF"/>
                 </a:solidFill>
               </a14:hiddenFill>
             </a:ext>
             <a:ext uri="{91240B29-F687-4F45-9708-019B960494DF}">
-              <a14:hiddenLine xmlns:a14="http://schemas.microsoft.com/office/drawing/2010/main" xmlns="" w="9525">
+              <a14:hiddenLine xmlns:a14="http://schemas.microsoft.com/office/drawing/2010/main" w="9525">
                 <a:solidFill>
                   <a:srgbClr val="000000"/>
                 </a:solidFill>
@@ -4341,7 +4371,7 @@
           <a:blip r:embed="rId3" cstate="email">
             <a:extLst>
               <a:ext uri="{28A0092B-C50C-407E-A947-70E740481C1C}">
-                <a14:useLocalDpi xmlns:a14="http://schemas.microsoft.com/office/drawing/2010/main" xmlns=""/>
+                <a14:useLocalDpi xmlns:a14="http://schemas.microsoft.com/office/drawing/2010/main"/>
               </a:ext>
             </a:extLst>
           </a:blip>
@@ -4355,7 +4385,7 @@
           <a:noFill/>
           <a:extLst>
             <a:ext uri="{909E8E84-426E-40DD-AFC4-6F175D3DCCD1}">
-              <a14:hiddenFill xmlns:a14="http://schemas.microsoft.com/office/drawing/2010/main" xmlns="">
+              <a14:hiddenFill xmlns:a14="http://schemas.microsoft.com/office/drawing/2010/main">
                 <a:solidFill>
                   <a:srgbClr val="FFFFFF"/>
                 </a:solidFill>
@@ -4378,7 +4408,7 @@
           <a:blip r:embed="rId4" cstate="email">
             <a:extLst>
               <a:ext uri="{28A0092B-C50C-407E-A947-70E740481C1C}">
-                <a14:useLocalDpi xmlns:a14="http://schemas.microsoft.com/office/drawing/2010/main" xmlns=""/>
+                <a14:useLocalDpi xmlns:a14="http://schemas.microsoft.com/office/drawing/2010/main"/>
               </a:ext>
             </a:extLst>
           </a:blip>
@@ -4392,7 +4422,7 @@
           <a:noFill/>
           <a:extLst>
             <a:ext uri="{909E8E84-426E-40DD-AFC4-6F175D3DCCD1}">
-              <a14:hiddenFill xmlns:a14="http://schemas.microsoft.com/office/drawing/2010/main" xmlns="">
+              <a14:hiddenFill xmlns:a14="http://schemas.microsoft.com/office/drawing/2010/main">
                 <a:solidFill>
                   <a:srgbClr val="FFFFFF"/>
                 </a:solidFill>
@@ -4415,7 +4445,7 @@
           <a:blip r:embed="rId5" cstate="email">
             <a:extLst>
               <a:ext uri="{28A0092B-C50C-407E-A947-70E740481C1C}">
-                <a14:useLocalDpi xmlns:a14="http://schemas.microsoft.com/office/drawing/2010/main" xmlns=""/>
+                <a14:useLocalDpi xmlns:a14="http://schemas.microsoft.com/office/drawing/2010/main"/>
               </a:ext>
             </a:extLst>
           </a:blip>
@@ -4432,7 +4462,7 @@
           </a:ln>
           <a:extLst>
             <a:ext uri="{909E8E84-426E-40DD-AFC4-6F175D3DCCD1}">
-              <a14:hiddenFill xmlns:a14="http://schemas.microsoft.com/office/drawing/2010/main" xmlns="">
+              <a14:hiddenFill xmlns:a14="http://schemas.microsoft.com/office/drawing/2010/main">
                 <a:solidFill>
                   <a:srgbClr val="FFFFFF"/>
                 </a:solidFill>
@@ -4455,7 +4485,7 @@
           <a:blip r:embed="rId6" cstate="email">
             <a:extLst>
               <a:ext uri="{28A0092B-C50C-407E-A947-70E740481C1C}">
-                <a14:useLocalDpi xmlns:a14="http://schemas.microsoft.com/office/drawing/2010/main" xmlns=""/>
+                <a14:useLocalDpi xmlns:a14="http://schemas.microsoft.com/office/drawing/2010/main"/>
               </a:ext>
             </a:extLst>
           </a:blip>
@@ -4469,7 +4499,7 @@
           <a:noFill/>
           <a:extLst>
             <a:ext uri="{909E8E84-426E-40DD-AFC4-6F175D3DCCD1}">
-              <a14:hiddenFill xmlns:a14="http://schemas.microsoft.com/office/drawing/2010/main" xmlns="">
+              <a14:hiddenFill xmlns:a14="http://schemas.microsoft.com/office/drawing/2010/main">
                 <a:solidFill>
                   <a:srgbClr val="FFFFFF"/>
                 </a:solidFill>
@@ -4492,7 +4522,7 @@
           <a:blip r:embed="rId7" cstate="email">
             <a:extLst>
               <a:ext uri="{28A0092B-C50C-407E-A947-70E740481C1C}">
-                <a14:useLocalDpi xmlns:a14="http://schemas.microsoft.com/office/drawing/2010/main" xmlns=""/>
+                <a14:useLocalDpi xmlns:a14="http://schemas.microsoft.com/office/drawing/2010/main"/>
               </a:ext>
             </a:extLst>
           </a:blip>
@@ -4506,18 +4536,18 @@
     </p:spTree>
     <p:extLst>
       <p:ext uri="{BB962C8B-B14F-4D97-AF65-F5344CB8AC3E}">
-        <p14:creationId xmlns:p14="http://schemas.microsoft.com/office/powerpoint/2010/main" xmlns="" val="377435107"/>
+        <p14:creationId xmlns:p14="http://schemas.microsoft.com/office/powerpoint/2010/main" val="377435107"/>
       </p:ext>
     </p:extLst>
   </p:cSld>
   <p:clrMapOvr>
     <a:masterClrMapping/>
   </p:clrMapOvr>
-  <mc:AlternateContent xmlns:mc="http://schemas.openxmlformats.org/markup-compatibility/2006">
-    <mc:Choice xmlns:p14="http://schemas.microsoft.com/office/powerpoint/2010/main" xmlns="" Requires="p14">
+  <mc:AlternateContent xmlns:mc="http://schemas.openxmlformats.org/markup-compatibility/2006" xmlns:p14="http://schemas.microsoft.com/office/powerpoint/2010/main">
+    <mc:Choice Requires="p14">
       <p:transition spd="slow" p14:dur="2000"/>
     </mc:Choice>
-    <mc:Fallback>
+    <mc:Fallback xmlns="">
       <p:transition spd="slow"/>
     </mc:Fallback>
   </mc:AlternateContent>
@@ -4684,11 +4714,405 @@
           </a:p>
         </p:txBody>
       </p:sp>
+      <p:pic>
+        <p:nvPicPr>
+          <p:cNvPr id="7" name="Grafik 6"/>
+          <p:cNvPicPr>
+            <a:picLocks noChangeAspect="1"/>
+          </p:cNvPicPr>
+          <p:nvPr/>
+        </p:nvPicPr>
+        <p:blipFill>
+          <a:blip r:embed="rId2">
+            <a:extLst>
+              <a:ext uri="{28A0092B-C50C-407E-A947-70E740481C1C}">
+                <a14:useLocalDpi xmlns:a14="http://schemas.microsoft.com/office/drawing/2010/main" val="0"/>
+              </a:ext>
+            </a:extLst>
+          </a:blip>
+          <a:stretch>
+            <a:fillRect/>
+          </a:stretch>
+        </p:blipFill>
+        <p:spPr>
+          <a:xfrm>
+            <a:off x="921192" y="2947559"/>
+            <a:ext cx="639779" cy="639779"/>
+          </a:xfrm>
+          <a:prstGeom prst="rect">
+            <a:avLst/>
+          </a:prstGeom>
+        </p:spPr>
+      </p:pic>
+      <p:pic>
+        <p:nvPicPr>
+          <p:cNvPr id="8" name="Grafik 7"/>
+          <p:cNvPicPr>
+            <a:picLocks noChangeAspect="1"/>
+          </p:cNvPicPr>
+          <p:nvPr/>
+        </p:nvPicPr>
+        <p:blipFill>
+          <a:blip r:embed="rId3" cstate="print">
+            <a:extLst>
+              <a:ext uri="{28A0092B-C50C-407E-A947-70E740481C1C}">
+                <a14:useLocalDpi xmlns:a14="http://schemas.microsoft.com/office/drawing/2010/main" val="0"/>
+              </a:ext>
+            </a:extLst>
+          </a:blip>
+          <a:stretch>
+            <a:fillRect/>
+          </a:stretch>
+        </p:blipFill>
+        <p:spPr>
+          <a:xfrm>
+            <a:off x="755336" y="3587338"/>
+            <a:ext cx="971492" cy="676806"/>
+          </a:xfrm>
+          <a:prstGeom prst="rect">
+            <a:avLst/>
+          </a:prstGeom>
+        </p:spPr>
+      </p:pic>
+      <p:pic>
+        <p:nvPicPr>
+          <p:cNvPr id="9" name="Grafik 8"/>
+          <p:cNvPicPr>
+            <a:picLocks noChangeAspect="1"/>
+          </p:cNvPicPr>
+          <p:nvPr/>
+        </p:nvPicPr>
+        <p:blipFill>
+          <a:blip r:embed="rId4" cstate="print">
+            <a:extLst>
+              <a:ext uri="{28A0092B-C50C-407E-A947-70E740481C1C}">
+                <a14:useLocalDpi xmlns:a14="http://schemas.microsoft.com/office/drawing/2010/main" val="0"/>
+              </a:ext>
+            </a:extLst>
+          </a:blip>
+          <a:stretch>
+            <a:fillRect/>
+          </a:stretch>
+        </p:blipFill>
+        <p:spPr>
+          <a:xfrm>
+            <a:off x="2756774" y="3135368"/>
+            <a:ext cx="991971" cy="764002"/>
+          </a:xfrm>
+          <a:prstGeom prst="rect">
+            <a:avLst/>
+          </a:prstGeom>
+        </p:spPr>
+      </p:pic>
+      <p:pic>
+        <p:nvPicPr>
+          <p:cNvPr id="10" name="Grafik 9"/>
+          <p:cNvPicPr>
+            <a:picLocks noChangeAspect="1"/>
+          </p:cNvPicPr>
+          <p:nvPr/>
+        </p:nvPicPr>
+        <p:blipFill>
+          <a:blip r:embed="rId5" cstate="print">
+            <a:extLst>
+              <a:ext uri="{28A0092B-C50C-407E-A947-70E740481C1C}">
+                <a14:useLocalDpi xmlns:a14="http://schemas.microsoft.com/office/drawing/2010/main" val="0"/>
+              </a:ext>
+            </a:extLst>
+          </a:blip>
+          <a:stretch>
+            <a:fillRect/>
+          </a:stretch>
+        </p:blipFill>
+        <p:spPr>
+          <a:xfrm>
+            <a:off x="4686299" y="3030266"/>
+            <a:ext cx="906170" cy="1114144"/>
+          </a:xfrm>
+          <a:prstGeom prst="rect">
+            <a:avLst/>
+          </a:prstGeom>
+        </p:spPr>
+      </p:pic>
+      <p:pic>
+        <p:nvPicPr>
+          <p:cNvPr id="11" name="Grafik 10"/>
+          <p:cNvPicPr>
+            <a:picLocks noChangeAspect="1"/>
+          </p:cNvPicPr>
+          <p:nvPr/>
+        </p:nvPicPr>
+        <p:blipFill>
+          <a:blip r:embed="rId6">
+            <a:extLst>
+              <a:ext uri="{28A0092B-C50C-407E-A947-70E740481C1C}">
+                <a14:useLocalDpi xmlns:a14="http://schemas.microsoft.com/office/drawing/2010/main" val="0"/>
+              </a:ext>
+            </a:extLst>
+          </a:blip>
+          <a:stretch>
+            <a:fillRect/>
+          </a:stretch>
+        </p:blipFill>
+        <p:spPr>
+          <a:xfrm>
+            <a:off x="6542931" y="2841611"/>
+            <a:ext cx="1675792" cy="1491454"/>
+          </a:xfrm>
+          <a:prstGeom prst="rect">
+            <a:avLst/>
+          </a:prstGeom>
+        </p:spPr>
+      </p:pic>
+      <p:sp>
+        <p:nvSpPr>
+          <p:cNvPr id="14" name="Pfeil nach rechts 13"/>
+          <p:cNvSpPr/>
+          <p:nvPr/>
+        </p:nvSpPr>
+        <p:spPr>
+          <a:xfrm>
+            <a:off x="4084189" y="3415431"/>
+            <a:ext cx="319562" cy="343814"/>
+          </a:xfrm>
+          <a:prstGeom prst="rightArrow">
+            <a:avLst/>
+          </a:prstGeom>
+        </p:spPr>
+        <p:style>
+          <a:lnRef idx="2">
+            <a:schemeClr val="accent1">
+              <a:shade val="50000"/>
+            </a:schemeClr>
+          </a:lnRef>
+          <a:fillRef idx="1">
+            <a:schemeClr val="accent1"/>
+          </a:fillRef>
+          <a:effectRef idx="0">
+            <a:schemeClr val="accent1"/>
+          </a:effectRef>
+          <a:fontRef idx="minor">
+            <a:schemeClr val="lt1"/>
+          </a:fontRef>
+        </p:style>
+        <p:txBody>
+          <a:bodyPr rtlCol="0" anchor="ctr"/>
+          <a:lstStyle/>
+          <a:p>
+            <a:pPr algn="ctr"/>
+            <a:endParaRPr lang="de-DE"/>
+          </a:p>
+        </p:txBody>
+      </p:sp>
+      <p:sp>
+        <p:nvSpPr>
+          <p:cNvPr id="15" name="Pfeil nach rechts 14"/>
+          <p:cNvSpPr/>
+          <p:nvPr/>
+        </p:nvSpPr>
+        <p:spPr>
+          <a:xfrm>
+            <a:off x="2096651" y="3415431"/>
+            <a:ext cx="319562" cy="343814"/>
+          </a:xfrm>
+          <a:prstGeom prst="rightArrow">
+            <a:avLst/>
+          </a:prstGeom>
+        </p:spPr>
+        <p:style>
+          <a:lnRef idx="2">
+            <a:schemeClr val="accent1">
+              <a:shade val="50000"/>
+            </a:schemeClr>
+          </a:lnRef>
+          <a:fillRef idx="1">
+            <a:schemeClr val="accent1"/>
+          </a:fillRef>
+          <a:effectRef idx="0">
+            <a:schemeClr val="accent1"/>
+          </a:effectRef>
+          <a:fontRef idx="minor">
+            <a:schemeClr val="lt1"/>
+          </a:fontRef>
+        </p:style>
+        <p:txBody>
+          <a:bodyPr rtlCol="0" anchor="ctr"/>
+          <a:lstStyle/>
+          <a:p>
+            <a:pPr algn="ctr"/>
+            <a:endParaRPr lang="de-DE"/>
+          </a:p>
+        </p:txBody>
+      </p:sp>
+      <p:sp>
+        <p:nvSpPr>
+          <p:cNvPr id="16" name="Pfeil nach rechts 15"/>
+          <p:cNvSpPr/>
+          <p:nvPr/>
+        </p:nvSpPr>
+        <p:spPr>
+          <a:xfrm>
+            <a:off x="5875017" y="3415431"/>
+            <a:ext cx="319562" cy="343814"/>
+          </a:xfrm>
+          <a:prstGeom prst="rightArrow">
+            <a:avLst/>
+          </a:prstGeom>
+        </p:spPr>
+        <p:style>
+          <a:lnRef idx="2">
+            <a:schemeClr val="accent1">
+              <a:shade val="50000"/>
+            </a:schemeClr>
+          </a:lnRef>
+          <a:fillRef idx="1">
+            <a:schemeClr val="accent1"/>
+          </a:fillRef>
+          <a:effectRef idx="0">
+            <a:schemeClr val="accent1"/>
+          </a:effectRef>
+          <a:fontRef idx="minor">
+            <a:schemeClr val="lt1"/>
+          </a:fontRef>
+        </p:style>
+        <p:txBody>
+          <a:bodyPr rtlCol="0" anchor="ctr"/>
+          <a:lstStyle/>
+          <a:p>
+            <a:pPr algn="ctr"/>
+            <a:endParaRPr lang="de-DE"/>
+          </a:p>
+        </p:txBody>
+      </p:sp>
+      <p:sp>
+        <p:nvSpPr>
+          <p:cNvPr id="21" name="Abgerundetes Rechteck 20"/>
+          <p:cNvSpPr/>
+          <p:nvPr/>
+        </p:nvSpPr>
+        <p:spPr>
+          <a:xfrm>
+            <a:off x="592532" y="2570525"/>
+            <a:ext cx="5749746" cy="2033626"/>
+          </a:xfrm>
+          <a:prstGeom prst="roundRect">
+            <a:avLst/>
+          </a:prstGeom>
+          <a:noFill/>
+          <a:ln>
+            <a:solidFill>
+              <a:srgbClr val="FF0000"/>
+            </a:solidFill>
+          </a:ln>
+        </p:spPr>
+        <p:style>
+          <a:lnRef idx="2">
+            <a:schemeClr val="accent1">
+              <a:shade val="50000"/>
+            </a:schemeClr>
+          </a:lnRef>
+          <a:fillRef idx="1">
+            <a:schemeClr val="accent1"/>
+          </a:fillRef>
+          <a:effectRef idx="0">
+            <a:schemeClr val="accent1"/>
+          </a:effectRef>
+          <a:fontRef idx="minor">
+            <a:schemeClr val="lt1"/>
+          </a:fontRef>
+        </p:style>
+        <p:txBody>
+          <a:bodyPr rtlCol="0" anchor="ctr"/>
+          <a:lstStyle/>
+          <a:p>
+            <a:pPr algn="ctr"/>
+            <a:endParaRPr lang="de-DE"/>
+          </a:p>
+        </p:txBody>
+      </p:sp>
     </p:spTree>
   </p:cSld>
   <p:clrMapOvr>
     <a:masterClrMapping/>
   </p:clrMapOvr>
+  <p:timing>
+    <p:tnLst>
+      <p:par>
+        <p:cTn id="1" dur="indefinite" restart="never" nodeType="tmRoot">
+          <p:childTnLst>
+            <p:seq concurrent="1" nextAc="seek">
+              <p:cTn id="2" dur="indefinite" nodeType="mainSeq">
+                <p:childTnLst>
+                  <p:par>
+                    <p:cTn id="3" fill="hold">
+                      <p:stCondLst>
+                        <p:cond delay="indefinite"/>
+                      </p:stCondLst>
+                      <p:childTnLst>
+                        <p:par>
+                          <p:cTn id="4" fill="hold">
+                            <p:stCondLst>
+                              <p:cond delay="0"/>
+                            </p:stCondLst>
+                            <p:childTnLst>
+                              <p:par>
+                                <p:cTn id="5" presetID="1" presetClass="entr" presetSubtype="0" fill="hold" grpId="0" nodeType="clickEffect">
+                                  <p:stCondLst>
+                                    <p:cond delay="0"/>
+                                  </p:stCondLst>
+                                  <p:childTnLst>
+                                    <p:set>
+                                      <p:cBhvr>
+                                        <p:cTn id="6" dur="1" fill="hold">
+                                          <p:stCondLst>
+                                            <p:cond delay="0"/>
+                                          </p:stCondLst>
+                                        </p:cTn>
+                                        <p:tgtEl>
+                                          <p:spTgt spid="21"/>
+                                        </p:tgtEl>
+                                        <p:attrNameLst>
+                                          <p:attrName>style.visibility</p:attrName>
+                                        </p:attrNameLst>
+                                      </p:cBhvr>
+                                      <p:to>
+                                        <p:strVal val="visible"/>
+                                      </p:to>
+                                    </p:set>
+                                  </p:childTnLst>
+                                </p:cTn>
+                              </p:par>
+                            </p:childTnLst>
+                          </p:cTn>
+                        </p:par>
+                      </p:childTnLst>
+                    </p:cTn>
+                  </p:par>
+                </p:childTnLst>
+              </p:cTn>
+              <p:prevCondLst>
+                <p:cond evt="onPrev" delay="0">
+                  <p:tgtEl>
+                    <p:sldTgt/>
+                  </p:tgtEl>
+                </p:cond>
+              </p:prevCondLst>
+              <p:nextCondLst>
+                <p:cond evt="onNext" delay="0">
+                  <p:tgtEl>
+                    <p:sldTgt/>
+                  </p:tgtEl>
+                </p:cond>
+              </p:nextCondLst>
+            </p:seq>
+          </p:childTnLst>
+        </p:cTn>
+      </p:par>
+    </p:tnLst>
+    <p:bldLst>
+      <p:bldP spid="21" grpId="0" animBg="1"/>
+    </p:bldLst>
+  </p:timing>
 </p:sld>
 </file>
 
@@ -4969,6 +5393,13 @@
   <p:clrMapOvr>
     <a:masterClrMapping/>
   </p:clrMapOvr>
+  <p:timing>
+    <p:tnLst>
+      <p:par>
+        <p:cTn id="1" dur="indefinite" restart="never" nodeType="tmRoot"/>
+      </p:par>
+    </p:tnLst>
+  </p:timing>
 </p:sld>
 </file>
 
@@ -5135,22 +5566,14 @@
             <a:pPr lvl="1"/>
             <a:r>
               <a:rPr lang="de-DE" dirty="0" smtClean="0"/>
-              <a:t>[</a:t>
-            </a:r>
+              <a:t>[Leitfähigkeit]</a:t>
+            </a:r>
+          </a:p>
+          <a:p>
+            <a:pPr lvl="1"/>
             <a:r>
               <a:rPr lang="de-DE" dirty="0" smtClean="0"/>
-              <a:t>Leitfähigkeit]</a:t>
-            </a:r>
-          </a:p>
-          <a:p>
-            <a:pPr lvl="1"/>
-            <a:r>
-              <a:rPr lang="de-DE" dirty="0" smtClean="0"/>
-              <a:t>[</a:t>
-            </a:r>
-            <a:r>
-              <a:rPr lang="de-DE" dirty="0" smtClean="0"/>
-              <a:t>gelöster Sauerstoff]</a:t>
+              <a:t>[gelöster Sauerstoff]</a:t>
             </a:r>
             <a:endParaRPr lang="de-DE" dirty="0"/>
           </a:p>
@@ -5291,6 +5714,13 @@
   <p:clrMapOvr>
     <a:masterClrMapping/>
   </p:clrMapOvr>
+  <p:timing>
+    <p:tnLst>
+      <p:par>
+        <p:cTn id="1" dur="indefinite" restart="never" nodeType="tmRoot"/>
+      </p:par>
+    </p:tnLst>
+  </p:timing>
 </p:sld>
 </file>
 
@@ -5563,14 +5993,12 @@
               <a:rPr lang="de-DE" dirty="0" smtClean="0"/>
               <a:t>21.06.17: Pflichtenheft </a:t>
             </a:r>
-            <a:endParaRPr lang="de-DE" dirty="0" smtClean="0"/>
           </a:p>
           <a:p>
             <a:r>
               <a:rPr lang="de-DE" dirty="0" smtClean="0"/>
               <a:t>XX.07.17: Inbetriebnahme von Messstation[en]</a:t>
             </a:r>
-            <a:endParaRPr lang="de-DE" dirty="0" smtClean="0"/>
           </a:p>
           <a:p>
             <a:r>

</xml_diff>

<commit_message>
added more file-formats to presentation
</commit_message>
<xml_diff>
--- a/doc/Praesentation_Meeting_13.06.2017.pptx
+++ b/doc/Praesentation_Meeting_13.06.2017.pptx
@@ -148,7 +148,7 @@
   </p:defaultTextStyle>
   <p:extLst>
     <p:ext uri="{EFAFB233-063F-42B5-8137-9DF3F51BA10A}">
-      <p15:sldGuideLst xmlns:p15="http://schemas.microsoft.com/office/powerpoint/2012/main">
+      <p15:sldGuideLst xmlns:p15="http://schemas.microsoft.com/office/powerpoint/2012/main" xmlns="">
         <p15:guide id="1" orient="horz">
           <p15:clr>
             <a:srgbClr val="A4A3A4"/>
@@ -162,7 +162,7 @@
       </p15:sldGuideLst>
     </p:ext>
     <p:ext uri="{2D200454-40CA-4A62-9FC3-DE9A4176ACB9}">
-      <p15:notesGuideLst xmlns:p15="http://schemas.microsoft.com/office/powerpoint/2012/main">
+      <p15:notesGuideLst xmlns:p15="http://schemas.microsoft.com/office/powerpoint/2012/main" xmlns="">
         <p15:guide id="1" orient="horz" pos="2140">
           <p15:clr>
             <a:srgbClr val="A4A3A4"/>
@@ -229,14 +229,14 @@
           <a:effectLst/>
           <a:extLst>
             <a:ext uri="{909E8E84-426E-40DD-AFC4-6F175D3DCCD1}">
-              <a14:hiddenFill xmlns:a14="http://schemas.microsoft.com/office/drawing/2010/main">
+              <a14:hiddenFill xmlns:a14="http://schemas.microsoft.com/office/drawing/2010/main" xmlns="">
                 <a:solidFill>
                   <a:schemeClr val="accent1"/>
                 </a:solidFill>
               </a14:hiddenFill>
             </a:ext>
             <a:ext uri="{91240B29-F687-4F45-9708-019B960494DF}">
-              <a14:hiddenLine xmlns:a14="http://schemas.microsoft.com/office/drawing/2010/main" w="9525">
+              <a14:hiddenLine xmlns:a14="http://schemas.microsoft.com/office/drawing/2010/main" xmlns="" w="9525">
                 <a:solidFill>
                   <a:schemeClr val="tx1"/>
                 </a:solidFill>
@@ -246,7 +246,7 @@
               </a14:hiddenLine>
             </a:ext>
             <a:ext uri="{AF507438-7753-43E0-B8FC-AC1667EBCBE1}">
-              <a14:hiddenEffects xmlns:a14="http://schemas.microsoft.com/office/drawing/2010/main">
+              <a14:hiddenEffects xmlns:a14="http://schemas.microsoft.com/office/drawing/2010/main" xmlns="">
                 <a:effectLst>
                   <a:outerShdw dist="35921" dir="2700000" algn="ctr" rotWithShape="0">
                     <a:schemeClr val="bg2"/>
@@ -300,14 +300,14 @@
           <a:effectLst/>
           <a:extLst>
             <a:ext uri="{909E8E84-426E-40DD-AFC4-6F175D3DCCD1}">
-              <a14:hiddenFill xmlns:a14="http://schemas.microsoft.com/office/drawing/2010/main">
+              <a14:hiddenFill xmlns:a14="http://schemas.microsoft.com/office/drawing/2010/main" xmlns="">
                 <a:solidFill>
                   <a:schemeClr val="accent1"/>
                 </a:solidFill>
               </a14:hiddenFill>
             </a:ext>
             <a:ext uri="{91240B29-F687-4F45-9708-019B960494DF}">
-              <a14:hiddenLine xmlns:a14="http://schemas.microsoft.com/office/drawing/2010/main" w="9525">
+              <a14:hiddenLine xmlns:a14="http://schemas.microsoft.com/office/drawing/2010/main" xmlns="" w="9525">
                 <a:solidFill>
                   <a:schemeClr val="tx1"/>
                 </a:solidFill>
@@ -317,7 +317,7 @@
               </a14:hiddenLine>
             </a:ext>
             <a:ext uri="{AF507438-7753-43E0-B8FC-AC1667EBCBE1}">
-              <a14:hiddenEffects xmlns:a14="http://schemas.microsoft.com/office/drawing/2010/main">
+              <a14:hiddenEffects xmlns:a14="http://schemas.microsoft.com/office/drawing/2010/main" xmlns="">
                 <a:effectLst>
                   <a:outerShdw dist="35921" dir="2700000" algn="ctr" rotWithShape="0">
                     <a:schemeClr val="bg2"/>
@@ -371,14 +371,14 @@
           <a:effectLst/>
           <a:extLst>
             <a:ext uri="{909E8E84-426E-40DD-AFC4-6F175D3DCCD1}">
-              <a14:hiddenFill xmlns:a14="http://schemas.microsoft.com/office/drawing/2010/main">
+              <a14:hiddenFill xmlns:a14="http://schemas.microsoft.com/office/drawing/2010/main" xmlns="">
                 <a:solidFill>
                   <a:schemeClr val="accent1"/>
                 </a:solidFill>
               </a14:hiddenFill>
             </a:ext>
             <a:ext uri="{91240B29-F687-4F45-9708-019B960494DF}">
-              <a14:hiddenLine xmlns:a14="http://schemas.microsoft.com/office/drawing/2010/main" w="9525">
+              <a14:hiddenLine xmlns:a14="http://schemas.microsoft.com/office/drawing/2010/main" xmlns="" w="9525">
                 <a:solidFill>
                   <a:schemeClr val="tx1"/>
                 </a:solidFill>
@@ -388,7 +388,7 @@
               </a14:hiddenLine>
             </a:ext>
             <a:ext uri="{AF507438-7753-43E0-B8FC-AC1667EBCBE1}">
-              <a14:hiddenEffects xmlns:a14="http://schemas.microsoft.com/office/drawing/2010/main">
+              <a14:hiddenEffects xmlns:a14="http://schemas.microsoft.com/office/drawing/2010/main" xmlns="">
                 <a:effectLst>
                   <a:outerShdw dist="35921" dir="2700000" algn="ctr" rotWithShape="0">
                     <a:schemeClr val="bg2"/>
@@ -442,14 +442,14 @@
           <a:effectLst/>
           <a:extLst>
             <a:ext uri="{909E8E84-426E-40DD-AFC4-6F175D3DCCD1}">
-              <a14:hiddenFill xmlns:a14="http://schemas.microsoft.com/office/drawing/2010/main">
+              <a14:hiddenFill xmlns:a14="http://schemas.microsoft.com/office/drawing/2010/main" xmlns="">
                 <a:solidFill>
                   <a:schemeClr val="accent1"/>
                 </a:solidFill>
               </a14:hiddenFill>
             </a:ext>
             <a:ext uri="{91240B29-F687-4F45-9708-019B960494DF}">
-              <a14:hiddenLine xmlns:a14="http://schemas.microsoft.com/office/drawing/2010/main" w="9525">
+              <a14:hiddenLine xmlns:a14="http://schemas.microsoft.com/office/drawing/2010/main" xmlns="" w="9525">
                 <a:solidFill>
                   <a:schemeClr val="tx1"/>
                 </a:solidFill>
@@ -459,7 +459,7 @@
               </a14:hiddenLine>
             </a:ext>
             <a:ext uri="{AF507438-7753-43E0-B8FC-AC1667EBCBE1}">
-              <a14:hiddenEffects xmlns:a14="http://schemas.microsoft.com/office/drawing/2010/main">
+              <a14:hiddenEffects xmlns:a14="http://schemas.microsoft.com/office/drawing/2010/main" xmlns="">
                 <a:effectLst>
                   <a:outerShdw dist="35921" dir="2700000" algn="ctr" rotWithShape="0">
                     <a:schemeClr val="bg2"/>
@@ -498,7 +498,7 @@
     </p:spTree>
     <p:extLst>
       <p:ext uri="{BB962C8B-B14F-4D97-AF65-F5344CB8AC3E}">
-        <p14:creationId xmlns:p14="http://schemas.microsoft.com/office/powerpoint/2010/main" val="1669010643"/>
+        <p14:creationId xmlns:p14="http://schemas.microsoft.com/office/powerpoint/2010/main" xmlns="" val="1669010643"/>
       </p:ext>
     </p:extLst>
   </p:cSld>
@@ -556,14 +556,14 @@
           <a:effectLst/>
           <a:extLst>
             <a:ext uri="{909E8E84-426E-40DD-AFC4-6F175D3DCCD1}">
-              <a14:hiddenFill xmlns:a14="http://schemas.microsoft.com/office/drawing/2010/main">
+              <a14:hiddenFill xmlns:a14="http://schemas.microsoft.com/office/drawing/2010/main" xmlns="">
                 <a:solidFill>
                   <a:schemeClr val="accent1"/>
                 </a:solidFill>
               </a14:hiddenFill>
             </a:ext>
             <a:ext uri="{91240B29-F687-4F45-9708-019B960494DF}">
-              <a14:hiddenLine xmlns:a14="http://schemas.microsoft.com/office/drawing/2010/main" w="9525">
+              <a14:hiddenLine xmlns:a14="http://schemas.microsoft.com/office/drawing/2010/main" xmlns="" w="9525">
                 <a:solidFill>
                   <a:schemeClr val="tx1"/>
                 </a:solidFill>
@@ -573,7 +573,7 @@
               </a14:hiddenLine>
             </a:ext>
             <a:ext uri="{AF507438-7753-43E0-B8FC-AC1667EBCBE1}">
-              <a14:hiddenEffects xmlns:a14="http://schemas.microsoft.com/office/drawing/2010/main">
+              <a14:hiddenEffects xmlns:a14="http://schemas.microsoft.com/office/drawing/2010/main" xmlns="">
                 <a:effectLst>
                   <a:outerShdw dist="35921" dir="2700000" algn="ctr" rotWithShape="0">
                     <a:schemeClr val="bg2"/>
@@ -627,14 +627,14 @@
           <a:effectLst/>
           <a:extLst>
             <a:ext uri="{909E8E84-426E-40DD-AFC4-6F175D3DCCD1}">
-              <a14:hiddenFill xmlns:a14="http://schemas.microsoft.com/office/drawing/2010/main">
+              <a14:hiddenFill xmlns:a14="http://schemas.microsoft.com/office/drawing/2010/main" xmlns="">
                 <a:solidFill>
                   <a:schemeClr val="accent1"/>
                 </a:solidFill>
               </a14:hiddenFill>
             </a:ext>
             <a:ext uri="{91240B29-F687-4F45-9708-019B960494DF}">
-              <a14:hiddenLine xmlns:a14="http://schemas.microsoft.com/office/drawing/2010/main" w="9525">
+              <a14:hiddenLine xmlns:a14="http://schemas.microsoft.com/office/drawing/2010/main" xmlns="" w="9525">
                 <a:solidFill>
                   <a:schemeClr val="tx1"/>
                 </a:solidFill>
@@ -644,7 +644,7 @@
               </a14:hiddenLine>
             </a:ext>
             <a:ext uri="{AF507438-7753-43E0-B8FC-AC1667EBCBE1}">
-              <a14:hiddenEffects xmlns:a14="http://schemas.microsoft.com/office/drawing/2010/main">
+              <a14:hiddenEffects xmlns:a14="http://schemas.microsoft.com/office/drawing/2010/main" xmlns="">
                 <a:effectLst>
                   <a:outerShdw dist="35921" dir="2700000" algn="ctr" rotWithShape="0">
                     <a:schemeClr val="bg2"/>
@@ -703,14 +703,14 @@
           <a:effectLst/>
           <a:extLst>
             <a:ext uri="{909E8E84-426E-40DD-AFC4-6F175D3DCCD1}">
-              <a14:hiddenFill xmlns:a14="http://schemas.microsoft.com/office/drawing/2010/main">
+              <a14:hiddenFill xmlns:a14="http://schemas.microsoft.com/office/drawing/2010/main" xmlns="">
                 <a:solidFill>
                   <a:srgbClr val="FFFFFF"/>
                 </a:solidFill>
               </a14:hiddenFill>
             </a:ext>
             <a:ext uri="{AF507438-7753-43E0-B8FC-AC1667EBCBE1}">
-              <a14:hiddenEffects xmlns:a14="http://schemas.microsoft.com/office/drawing/2010/main">
+              <a14:hiddenEffects xmlns:a14="http://schemas.microsoft.com/office/drawing/2010/main" xmlns="">
                 <a:effectLst>
                   <a:outerShdw dist="35921" dir="2700000" algn="ctr" rotWithShape="0">
                     <a:srgbClr val="808080"/>
@@ -719,7 +719,7 @@
               </a14:hiddenEffects>
             </a:ext>
             <a:ext uri="{53640926-AAD7-44D8-BBD7-CCE9431645EC}">
-              <a14:shadowObscured xmlns:a14="http://schemas.microsoft.com/office/drawing/2010/main" val="1"/>
+              <a14:shadowObscured xmlns:a14="http://schemas.microsoft.com/office/drawing/2010/main" xmlns="" val="1"/>
             </a:ext>
           </a:extLst>
         </p:spPr>
@@ -749,14 +749,14 @@
           <a:effectLst/>
           <a:extLst>
             <a:ext uri="{909E8E84-426E-40DD-AFC4-6F175D3DCCD1}">
-              <a14:hiddenFill xmlns:a14="http://schemas.microsoft.com/office/drawing/2010/main">
+              <a14:hiddenFill xmlns:a14="http://schemas.microsoft.com/office/drawing/2010/main" xmlns="">
                 <a:solidFill>
                   <a:schemeClr val="accent1"/>
                 </a:solidFill>
               </a14:hiddenFill>
             </a:ext>
             <a:ext uri="{91240B29-F687-4F45-9708-019B960494DF}">
-              <a14:hiddenLine xmlns:a14="http://schemas.microsoft.com/office/drawing/2010/main" w="9525">
+              <a14:hiddenLine xmlns:a14="http://schemas.microsoft.com/office/drawing/2010/main" xmlns="" w="9525">
                 <a:solidFill>
                   <a:schemeClr val="tx1"/>
                 </a:solidFill>
@@ -766,7 +766,7 @@
               </a14:hiddenLine>
             </a:ext>
             <a:ext uri="{AF507438-7753-43E0-B8FC-AC1667EBCBE1}">
-              <a14:hiddenEffects xmlns:a14="http://schemas.microsoft.com/office/drawing/2010/main">
+              <a14:hiddenEffects xmlns:a14="http://schemas.microsoft.com/office/drawing/2010/main" xmlns="">
                 <a:effectLst>
                   <a:outerShdw dist="35921" dir="2700000" algn="ctr" rotWithShape="0">
                     <a:schemeClr val="bg2"/>
@@ -845,14 +845,14 @@
           <a:effectLst/>
           <a:extLst>
             <a:ext uri="{909E8E84-426E-40DD-AFC4-6F175D3DCCD1}">
-              <a14:hiddenFill xmlns:a14="http://schemas.microsoft.com/office/drawing/2010/main">
+              <a14:hiddenFill xmlns:a14="http://schemas.microsoft.com/office/drawing/2010/main" xmlns="">
                 <a:solidFill>
                   <a:schemeClr val="accent1"/>
                 </a:solidFill>
               </a14:hiddenFill>
             </a:ext>
             <a:ext uri="{91240B29-F687-4F45-9708-019B960494DF}">
-              <a14:hiddenLine xmlns:a14="http://schemas.microsoft.com/office/drawing/2010/main" w="9525">
+              <a14:hiddenLine xmlns:a14="http://schemas.microsoft.com/office/drawing/2010/main" xmlns="" w="9525">
                 <a:solidFill>
                   <a:schemeClr val="tx1"/>
                 </a:solidFill>
@@ -862,7 +862,7 @@
               </a14:hiddenLine>
             </a:ext>
             <a:ext uri="{AF507438-7753-43E0-B8FC-AC1667EBCBE1}">
-              <a14:hiddenEffects xmlns:a14="http://schemas.microsoft.com/office/drawing/2010/main">
+              <a14:hiddenEffects xmlns:a14="http://schemas.microsoft.com/office/drawing/2010/main" xmlns="">
                 <a:effectLst>
                   <a:outerShdw dist="35921" dir="2700000" algn="ctr" rotWithShape="0">
                     <a:schemeClr val="bg2"/>
@@ -916,14 +916,14 @@
           <a:effectLst/>
           <a:extLst>
             <a:ext uri="{909E8E84-426E-40DD-AFC4-6F175D3DCCD1}">
-              <a14:hiddenFill xmlns:a14="http://schemas.microsoft.com/office/drawing/2010/main">
+              <a14:hiddenFill xmlns:a14="http://schemas.microsoft.com/office/drawing/2010/main" xmlns="">
                 <a:solidFill>
                   <a:schemeClr val="accent1"/>
                 </a:solidFill>
               </a14:hiddenFill>
             </a:ext>
             <a:ext uri="{91240B29-F687-4F45-9708-019B960494DF}">
-              <a14:hiddenLine xmlns:a14="http://schemas.microsoft.com/office/drawing/2010/main" w="9525">
+              <a14:hiddenLine xmlns:a14="http://schemas.microsoft.com/office/drawing/2010/main" xmlns="" w="9525">
                 <a:solidFill>
                   <a:schemeClr val="tx1"/>
                 </a:solidFill>
@@ -933,7 +933,7 @@
               </a14:hiddenLine>
             </a:ext>
             <a:ext uri="{AF507438-7753-43E0-B8FC-AC1667EBCBE1}">
-              <a14:hiddenEffects xmlns:a14="http://schemas.microsoft.com/office/drawing/2010/main">
+              <a14:hiddenEffects xmlns:a14="http://schemas.microsoft.com/office/drawing/2010/main" xmlns="">
                 <a:effectLst>
                   <a:outerShdw dist="35921" dir="2700000" algn="ctr" rotWithShape="0">
                     <a:schemeClr val="bg2"/>
@@ -972,7 +972,7 @@
     </p:spTree>
     <p:extLst>
       <p:ext uri="{BB962C8B-B14F-4D97-AF65-F5344CB8AC3E}">
-        <p14:creationId xmlns:p14="http://schemas.microsoft.com/office/powerpoint/2010/main" val="4094411869"/>
+        <p14:creationId xmlns:p14="http://schemas.microsoft.com/office/powerpoint/2010/main" xmlns="" val="4094411869"/>
       </p:ext>
     </p:extLst>
   </p:cSld>
@@ -1131,7 +1131,7 @@
           <a:blip r:embed="rId2" cstate="print">
             <a:extLst>
               <a:ext uri="{28A0092B-C50C-407E-A947-70E740481C1C}">
-                <a14:useLocalDpi xmlns:a14="http://schemas.microsoft.com/office/drawing/2010/main" val="0"/>
+                <a14:useLocalDpi xmlns:a14="http://schemas.microsoft.com/office/drawing/2010/main" xmlns="" val="0"/>
               </a:ext>
             </a:extLst>
           </a:blip>
@@ -1150,7 +1150,7 @@
           <a:noFill/>
           <a:extLst>
             <a:ext uri="{909E8E84-426E-40DD-AFC4-6F175D3DCCD1}">
-              <a14:hiddenFill xmlns:a14="http://schemas.microsoft.com/office/drawing/2010/main">
+              <a14:hiddenFill xmlns:a14="http://schemas.microsoft.com/office/drawing/2010/main" xmlns="">
                 <a:solidFill>
                   <a:srgbClr val="FFFFFF"/>
                 </a:solidFill>
@@ -1171,7 +1171,7 @@
           <a:blip r:embed="rId3" cstate="email">
             <a:extLst>
               <a:ext uri="{28A0092B-C50C-407E-A947-70E740481C1C}">
-                <a14:useLocalDpi xmlns:a14="http://schemas.microsoft.com/office/drawing/2010/main"/>
+                <a14:useLocalDpi xmlns:a14="http://schemas.microsoft.com/office/drawing/2010/main" xmlns=""/>
               </a:ext>
             </a:extLst>
           </a:blip>
@@ -1193,14 +1193,14 @@
           <a:effectLst/>
           <a:extLst>
             <a:ext uri="{909E8E84-426E-40DD-AFC4-6F175D3DCCD1}">
-              <a14:hiddenFill xmlns:a14="http://schemas.microsoft.com/office/drawing/2010/main">
+              <a14:hiddenFill xmlns:a14="http://schemas.microsoft.com/office/drawing/2010/main" xmlns="">
                 <a:solidFill>
                   <a:schemeClr val="accent1"/>
                 </a:solidFill>
               </a14:hiddenFill>
             </a:ext>
             <a:ext uri="{91240B29-F687-4F45-9708-019B960494DF}">
-              <a14:hiddenLine xmlns:a14="http://schemas.microsoft.com/office/drawing/2010/main" w="9525">
+              <a14:hiddenLine xmlns:a14="http://schemas.microsoft.com/office/drawing/2010/main" xmlns="" w="9525">
                 <a:solidFill>
                   <a:schemeClr val="tx1"/>
                 </a:solidFill>
@@ -1210,7 +1210,7 @@
               </a14:hiddenLine>
             </a:ext>
             <a:ext uri="{AF507438-7753-43E0-B8FC-AC1667EBCBE1}">
-              <a14:hiddenEffects xmlns:a14="http://schemas.microsoft.com/office/drawing/2010/main">
+              <a14:hiddenEffects xmlns:a14="http://schemas.microsoft.com/office/drawing/2010/main" xmlns="">
                 <a:effectLst>
                   <a:outerShdw dist="35921" dir="2700000" algn="ctr" rotWithShape="0">
                     <a:schemeClr val="bg2"/>
@@ -1287,14 +1287,14 @@
           <a:noFill/>
           <a:extLst>
             <a:ext uri="{909E8E84-426E-40DD-AFC4-6F175D3DCCD1}">
-              <a14:hiddenFill xmlns:a14="http://schemas.microsoft.com/office/drawing/2010/main">
+              <a14:hiddenFill xmlns:a14="http://schemas.microsoft.com/office/drawing/2010/main" xmlns="">
                 <a:solidFill>
                   <a:schemeClr val="accent1"/>
                 </a:solidFill>
               </a14:hiddenFill>
             </a:ext>
             <a:ext uri="{91240B29-F687-4F45-9708-019B960494DF}">
-              <a14:hiddenLine xmlns:a14="http://schemas.microsoft.com/office/drawing/2010/main" w="9525">
+              <a14:hiddenLine xmlns:a14="http://schemas.microsoft.com/office/drawing/2010/main" xmlns="" w="9525">
                 <a:solidFill>
                   <a:schemeClr val="tx1"/>
                 </a:solidFill>
@@ -1304,7 +1304,7 @@
               </a14:hiddenLine>
             </a:ext>
             <a:ext uri="{AF507438-7753-43E0-B8FC-AC1667EBCBE1}">
-              <a14:hiddenEffects xmlns:a14="http://schemas.microsoft.com/office/drawing/2010/main">
+              <a14:hiddenEffects xmlns:a14="http://schemas.microsoft.com/office/drawing/2010/main" xmlns="">
                 <a:effectLst>
                   <a:outerShdw dist="35921" dir="2700000" algn="ctr" rotWithShape="0">
                     <a:schemeClr val="bg2"/>
@@ -1615,7 +1615,7 @@
           <a:effectLst/>
           <a:extLst>
             <a:ext uri="{91240B29-F687-4F45-9708-019B960494DF}">
-              <a14:hiddenLine xmlns:a14="http://schemas.microsoft.com/office/drawing/2010/main" w="9525">
+              <a14:hiddenLine xmlns:a14="http://schemas.microsoft.com/office/drawing/2010/main" xmlns="" w="9525">
                 <a:solidFill>
                   <a:schemeClr val="tx1"/>
                 </a:solidFill>
@@ -1625,7 +1625,7 @@
               </a14:hiddenLine>
             </a:ext>
             <a:ext uri="{AF507438-7753-43E0-B8FC-AC1667EBCBE1}">
-              <a14:hiddenEffects xmlns:a14="http://schemas.microsoft.com/office/drawing/2010/main">
+              <a14:hiddenEffects xmlns:a14="http://schemas.microsoft.com/office/drawing/2010/main" xmlns="">
                 <a:effectLst>
                   <a:outerShdw dist="35921" dir="2700000" algn="ctr" rotWithShape="0">
                     <a:schemeClr val="bg2"/>
@@ -1833,7 +1833,7 @@
           <a:effectLst/>
           <a:extLst>
             <a:ext uri="{91240B29-F687-4F45-9708-019B960494DF}">
-              <a14:hiddenLine xmlns:a14="http://schemas.microsoft.com/office/drawing/2010/main" w="9525">
+              <a14:hiddenLine xmlns:a14="http://schemas.microsoft.com/office/drawing/2010/main" xmlns="" w="9525">
                 <a:solidFill>
                   <a:schemeClr val="tx1"/>
                 </a:solidFill>
@@ -1843,7 +1843,7 @@
               </a14:hiddenLine>
             </a:ext>
             <a:ext uri="{AF507438-7753-43E0-B8FC-AC1667EBCBE1}">
-              <a14:hiddenEffects xmlns:a14="http://schemas.microsoft.com/office/drawing/2010/main">
+              <a14:hiddenEffects xmlns:a14="http://schemas.microsoft.com/office/drawing/2010/main" xmlns="">
                 <a:effectLst>
                   <a:outerShdw dist="35921" dir="2700000" algn="ctr" rotWithShape="0">
                     <a:schemeClr val="bg2"/>
@@ -2029,7 +2029,7 @@
     </p:spTree>
     <p:extLst>
       <p:ext uri="{BB962C8B-B14F-4D97-AF65-F5344CB8AC3E}">
-        <p14:creationId xmlns:p14="http://schemas.microsoft.com/office/powerpoint/2010/main" val="3997811741"/>
+        <p14:creationId xmlns:p14="http://schemas.microsoft.com/office/powerpoint/2010/main" xmlns="" val="3997811741"/>
       </p:ext>
     </p:extLst>
   </p:cSld>
@@ -2330,7 +2330,7 @@
     </p:spTree>
     <p:extLst>
       <p:ext uri="{BB962C8B-B14F-4D97-AF65-F5344CB8AC3E}">
-        <p14:creationId xmlns:p14="http://schemas.microsoft.com/office/powerpoint/2010/main" val="381220797"/>
+        <p14:creationId xmlns:p14="http://schemas.microsoft.com/office/powerpoint/2010/main" xmlns="" val="381220797"/>
       </p:ext>
     </p:extLst>
   </p:cSld>
@@ -2627,7 +2627,7 @@
     </p:spTree>
     <p:extLst>
       <p:ext uri="{BB962C8B-B14F-4D97-AF65-F5344CB8AC3E}">
-        <p14:creationId xmlns:p14="http://schemas.microsoft.com/office/powerpoint/2010/main" val="740450729"/>
+        <p14:creationId xmlns:p14="http://schemas.microsoft.com/office/powerpoint/2010/main" xmlns="" val="740450729"/>
       </p:ext>
     </p:extLst>
   </p:cSld>
@@ -2924,7 +2924,7 @@
     </p:spTree>
     <p:extLst>
       <p:ext uri="{BB962C8B-B14F-4D97-AF65-F5344CB8AC3E}">
-        <p14:creationId xmlns:p14="http://schemas.microsoft.com/office/powerpoint/2010/main" val="1462842395"/>
+        <p14:creationId xmlns:p14="http://schemas.microsoft.com/office/powerpoint/2010/main" xmlns="" val="1462842395"/>
       </p:ext>
     </p:extLst>
   </p:cSld>
@@ -3151,7 +3151,7 @@
     </p:spTree>
     <p:extLst>
       <p:ext uri="{BB962C8B-B14F-4D97-AF65-F5344CB8AC3E}">
-        <p14:creationId xmlns:p14="http://schemas.microsoft.com/office/powerpoint/2010/main" val="1106715229"/>
+        <p14:creationId xmlns:p14="http://schemas.microsoft.com/office/powerpoint/2010/main" xmlns="" val="1106715229"/>
       </p:ext>
     </p:extLst>
   </p:cSld>
@@ -3471,7 +3471,7 @@
     </p:spTree>
     <p:extLst>
       <p:ext uri="{BB962C8B-B14F-4D97-AF65-F5344CB8AC3E}">
-        <p14:creationId xmlns:p14="http://schemas.microsoft.com/office/powerpoint/2010/main" val="1233670126"/>
+        <p14:creationId xmlns:p14="http://schemas.microsoft.com/office/powerpoint/2010/main" xmlns="" val="1233670126"/>
       </p:ext>
     </p:extLst>
   </p:cSld>
@@ -3553,7 +3553,7 @@
           <a:blip r:embed="rId8" cstate="email">
             <a:extLst>
               <a:ext uri="{28A0092B-C50C-407E-A947-70E740481C1C}">
-                <a14:useLocalDpi xmlns:a14="http://schemas.microsoft.com/office/drawing/2010/main"/>
+                <a14:useLocalDpi xmlns:a14="http://schemas.microsoft.com/office/drawing/2010/main" xmlns=""/>
               </a:ext>
             </a:extLst>
           </a:blip>
@@ -3571,7 +3571,7 @@
           <a:noFill/>
           <a:extLst>
             <a:ext uri="{909E8E84-426E-40DD-AFC4-6F175D3DCCD1}">
-              <a14:hiddenFill xmlns:a14="http://schemas.microsoft.com/office/drawing/2010/main">
+              <a14:hiddenFill xmlns:a14="http://schemas.microsoft.com/office/drawing/2010/main" xmlns="">
                 <a:solidFill>
                   <a:srgbClr val="FFFFFF"/>
                 </a:solidFill>
@@ -3605,14 +3605,14 @@
           <a:effectLst/>
           <a:extLst>
             <a:ext uri="{909E8E84-426E-40DD-AFC4-6F175D3DCCD1}">
-              <a14:hiddenFill xmlns:a14="http://schemas.microsoft.com/office/drawing/2010/main">
+              <a14:hiddenFill xmlns:a14="http://schemas.microsoft.com/office/drawing/2010/main" xmlns="">
                 <a:solidFill>
                   <a:schemeClr val="accent1"/>
                 </a:solidFill>
               </a14:hiddenFill>
             </a:ext>
             <a:ext uri="{91240B29-F687-4F45-9708-019B960494DF}">
-              <a14:hiddenLine xmlns:a14="http://schemas.microsoft.com/office/drawing/2010/main" w="9525">
+              <a14:hiddenLine xmlns:a14="http://schemas.microsoft.com/office/drawing/2010/main" xmlns="" w="9525">
                 <a:solidFill>
                   <a:schemeClr val="tx1"/>
                 </a:solidFill>
@@ -3622,7 +3622,7 @@
               </a14:hiddenLine>
             </a:ext>
             <a:ext uri="{AF507438-7753-43E0-B8FC-AC1667EBCBE1}">
-              <a14:hiddenEffects xmlns:a14="http://schemas.microsoft.com/office/drawing/2010/main">
+              <a14:hiddenEffects xmlns:a14="http://schemas.microsoft.com/office/drawing/2010/main" xmlns="">
                 <a:effectLst>
                   <a:outerShdw dist="35921" dir="2700000" algn="ctr" rotWithShape="0">
                     <a:schemeClr val="bg2"/>
@@ -3685,14 +3685,14 @@
           <a:effectLst/>
           <a:extLst>
             <a:ext uri="{909E8E84-426E-40DD-AFC4-6F175D3DCCD1}">
-              <a14:hiddenFill xmlns:a14="http://schemas.microsoft.com/office/drawing/2010/main">
+              <a14:hiddenFill xmlns:a14="http://schemas.microsoft.com/office/drawing/2010/main" xmlns="">
                 <a:solidFill>
                   <a:schemeClr val="accent1"/>
                 </a:solidFill>
               </a14:hiddenFill>
             </a:ext>
             <a:ext uri="{91240B29-F687-4F45-9708-019B960494DF}">
-              <a14:hiddenLine xmlns:a14="http://schemas.microsoft.com/office/drawing/2010/main" w="9525">
+              <a14:hiddenLine xmlns:a14="http://schemas.microsoft.com/office/drawing/2010/main" xmlns="" w="9525">
                 <a:solidFill>
                   <a:schemeClr val="tx1"/>
                 </a:solidFill>
@@ -3702,7 +3702,7 @@
               </a14:hiddenLine>
             </a:ext>
             <a:ext uri="{AF507438-7753-43E0-B8FC-AC1667EBCBE1}">
-              <a14:hiddenEffects xmlns:a14="http://schemas.microsoft.com/office/drawing/2010/main">
+              <a14:hiddenEffects xmlns:a14="http://schemas.microsoft.com/office/drawing/2010/main" xmlns="">
                 <a:effectLst>
                   <a:outerShdw dist="35921" dir="2700000" algn="ctr" rotWithShape="0">
                     <a:schemeClr val="bg2"/>
@@ -3755,7 +3755,7 @@
           <a:blip r:embed="rId8" cstate="email">
             <a:extLst>
               <a:ext uri="{28A0092B-C50C-407E-A947-70E740481C1C}">
-                <a14:useLocalDpi xmlns:a14="http://schemas.microsoft.com/office/drawing/2010/main"/>
+                <a14:useLocalDpi xmlns:a14="http://schemas.microsoft.com/office/drawing/2010/main" xmlns=""/>
               </a:ext>
             </a:extLst>
           </a:blip>
@@ -3773,7 +3773,7 @@
           <a:noFill/>
           <a:extLst>
             <a:ext uri="{909E8E84-426E-40DD-AFC4-6F175D3DCCD1}">
-              <a14:hiddenFill xmlns:a14="http://schemas.microsoft.com/office/drawing/2010/main">
+              <a14:hiddenFill xmlns:a14="http://schemas.microsoft.com/office/drawing/2010/main" xmlns="">
                 <a:solidFill>
                   <a:srgbClr val="FFFFFF"/>
                 </a:solidFill>
@@ -4259,52 +4259,6 @@
           <a:chExt cx="0" cy="0"/>
         </a:xfrm>
       </p:grpSpPr>
-      <p:sp>
-        <p:nvSpPr>
-          <p:cNvPr id="2" name="Titel 1"/>
-          <p:cNvSpPr>
-            <a:spLocks noGrp="1"/>
-          </p:cNvSpPr>
-          <p:nvPr>
-            <p:ph type="ctrTitle"/>
-          </p:nvPr>
-        </p:nvSpPr>
-        <p:spPr/>
-        <p:txBody>
-          <a:bodyPr/>
-          <a:lstStyle/>
-          <a:p>
-            <a:r>
-              <a:rPr lang="de-DE" dirty="0" smtClean="0"/>
-              <a:t>Titel der Veranstaltung</a:t>
-            </a:r>
-            <a:endParaRPr lang="de-DE" dirty="0"/>
-          </a:p>
-        </p:txBody>
-      </p:sp>
-      <p:sp>
-        <p:nvSpPr>
-          <p:cNvPr id="3" name="Untertitel 2"/>
-          <p:cNvSpPr>
-            <a:spLocks noGrp="1"/>
-          </p:cNvSpPr>
-          <p:nvPr>
-            <p:ph type="subTitle" idx="1"/>
-          </p:nvPr>
-        </p:nvSpPr>
-        <p:spPr/>
-        <p:txBody>
-          <a:bodyPr/>
-          <a:lstStyle/>
-          <a:p>
-            <a:r>
-              <a:rPr lang="de-DE" dirty="0" smtClean="0"/>
-              <a:t>Name Vortragende/-r</a:t>
-            </a:r>
-            <a:endParaRPr lang="de-DE" dirty="0"/>
-          </a:p>
-        </p:txBody>
-      </p:sp>
       <p:pic>
         <p:nvPicPr>
           <p:cNvPr id="10" name="Picture 36" descr="Grashof für ppt"/>
@@ -4319,7 +4273,7 @@
           <a:blip r:embed="rId2" cstate="email">
             <a:extLst>
               <a:ext uri="{28A0092B-C50C-407E-A947-70E740481C1C}">
-                <a14:useLocalDpi xmlns:a14="http://schemas.microsoft.com/office/drawing/2010/main"/>
+                <a14:useLocalDpi xmlns:a14="http://schemas.microsoft.com/office/drawing/2010/main" xmlns=""/>
               </a:ext>
             </a:extLst>
           </a:blip>
@@ -4338,14 +4292,14 @@
           </a:ln>
           <a:extLst>
             <a:ext uri="{909E8E84-426E-40DD-AFC4-6F175D3DCCD1}">
-              <a14:hiddenFill xmlns:a14="http://schemas.microsoft.com/office/drawing/2010/main">
+              <a14:hiddenFill xmlns:a14="http://schemas.microsoft.com/office/drawing/2010/main" xmlns="">
                 <a:solidFill>
                   <a:srgbClr val="FFFFFF"/>
                 </a:solidFill>
               </a14:hiddenFill>
             </a:ext>
             <a:ext uri="{91240B29-F687-4F45-9708-019B960494DF}">
-              <a14:hiddenLine xmlns:a14="http://schemas.microsoft.com/office/drawing/2010/main" w="9525">
+              <a14:hiddenLine xmlns:a14="http://schemas.microsoft.com/office/drawing/2010/main" xmlns="" w="9525">
                 <a:solidFill>
                   <a:srgbClr val="000000"/>
                 </a:solidFill>
@@ -4371,7 +4325,7 @@
           <a:blip r:embed="rId3" cstate="email">
             <a:extLst>
               <a:ext uri="{28A0092B-C50C-407E-A947-70E740481C1C}">
-                <a14:useLocalDpi xmlns:a14="http://schemas.microsoft.com/office/drawing/2010/main"/>
+                <a14:useLocalDpi xmlns:a14="http://schemas.microsoft.com/office/drawing/2010/main" xmlns=""/>
               </a:ext>
             </a:extLst>
           </a:blip>
@@ -4385,7 +4339,7 @@
           <a:noFill/>
           <a:extLst>
             <a:ext uri="{909E8E84-426E-40DD-AFC4-6F175D3DCCD1}">
-              <a14:hiddenFill xmlns:a14="http://schemas.microsoft.com/office/drawing/2010/main">
+              <a14:hiddenFill xmlns:a14="http://schemas.microsoft.com/office/drawing/2010/main" xmlns="">
                 <a:solidFill>
                   <a:srgbClr val="FFFFFF"/>
                 </a:solidFill>
@@ -4408,7 +4362,7 @@
           <a:blip r:embed="rId4" cstate="email">
             <a:extLst>
               <a:ext uri="{28A0092B-C50C-407E-A947-70E740481C1C}">
-                <a14:useLocalDpi xmlns:a14="http://schemas.microsoft.com/office/drawing/2010/main"/>
+                <a14:useLocalDpi xmlns:a14="http://schemas.microsoft.com/office/drawing/2010/main" xmlns=""/>
               </a:ext>
             </a:extLst>
           </a:blip>
@@ -4422,7 +4376,7 @@
           <a:noFill/>
           <a:extLst>
             <a:ext uri="{909E8E84-426E-40DD-AFC4-6F175D3DCCD1}">
-              <a14:hiddenFill xmlns:a14="http://schemas.microsoft.com/office/drawing/2010/main">
+              <a14:hiddenFill xmlns:a14="http://schemas.microsoft.com/office/drawing/2010/main" xmlns="">
                 <a:solidFill>
                   <a:srgbClr val="FFFFFF"/>
                 </a:solidFill>
@@ -4445,7 +4399,7 @@
           <a:blip r:embed="rId5" cstate="email">
             <a:extLst>
               <a:ext uri="{28A0092B-C50C-407E-A947-70E740481C1C}">
-                <a14:useLocalDpi xmlns:a14="http://schemas.microsoft.com/office/drawing/2010/main"/>
+                <a14:useLocalDpi xmlns:a14="http://schemas.microsoft.com/office/drawing/2010/main" xmlns=""/>
               </a:ext>
             </a:extLst>
           </a:blip>
@@ -4462,7 +4416,7 @@
           </a:ln>
           <a:extLst>
             <a:ext uri="{909E8E84-426E-40DD-AFC4-6F175D3DCCD1}">
-              <a14:hiddenFill xmlns:a14="http://schemas.microsoft.com/office/drawing/2010/main">
+              <a14:hiddenFill xmlns:a14="http://schemas.microsoft.com/office/drawing/2010/main" xmlns="">
                 <a:solidFill>
                   <a:srgbClr val="FFFFFF"/>
                 </a:solidFill>
@@ -4485,7 +4439,7 @@
           <a:blip r:embed="rId6" cstate="email">
             <a:extLst>
               <a:ext uri="{28A0092B-C50C-407E-A947-70E740481C1C}">
-                <a14:useLocalDpi xmlns:a14="http://schemas.microsoft.com/office/drawing/2010/main"/>
+                <a14:useLocalDpi xmlns:a14="http://schemas.microsoft.com/office/drawing/2010/main" xmlns=""/>
               </a:ext>
             </a:extLst>
           </a:blip>
@@ -4499,7 +4453,7 @@
           <a:noFill/>
           <a:extLst>
             <a:ext uri="{909E8E84-426E-40DD-AFC4-6F175D3DCCD1}">
-              <a14:hiddenFill xmlns:a14="http://schemas.microsoft.com/office/drawing/2010/main">
+              <a14:hiddenFill xmlns:a14="http://schemas.microsoft.com/office/drawing/2010/main" xmlns="">
                 <a:solidFill>
                   <a:srgbClr val="FFFFFF"/>
                 </a:solidFill>
@@ -4522,7 +4476,7 @@
           <a:blip r:embed="rId7" cstate="email">
             <a:extLst>
               <a:ext uri="{28A0092B-C50C-407E-A947-70E740481C1C}">
-                <a14:useLocalDpi xmlns:a14="http://schemas.microsoft.com/office/drawing/2010/main"/>
+                <a14:useLocalDpi xmlns:a14="http://schemas.microsoft.com/office/drawing/2010/main" xmlns=""/>
               </a:ext>
             </a:extLst>
           </a:blip>
@@ -4533,21 +4487,243 @@
         </p:blipFill>
         <p:spPr/>
       </p:pic>
+      <p:sp>
+        <p:nvSpPr>
+          <p:cNvPr id="16" name="Titel 1"/>
+          <p:cNvSpPr txBox="1">
+            <a:spLocks/>
+          </p:cNvSpPr>
+          <p:nvPr/>
+        </p:nvSpPr>
+        <p:spPr bwMode="auto">
+          <a:xfrm>
+            <a:off x="539550" y="1946139"/>
+            <a:ext cx="4392484" cy="3384377"/>
+          </a:xfrm>
+          <a:prstGeom prst="rect">
+            <a:avLst/>
+          </a:prstGeom>
+          <a:noFill/>
+          <a:extLst>
+            <a:ext uri="{909E8E84-426E-40DD-AFC4-6F175D3DCCD1}">
+              <a14:hiddenFill xmlns:a14="http://schemas.microsoft.com/office/drawing/2010/main" xmlns="">
+                <a:solidFill>
+                  <a:schemeClr val="accent1"/>
+                </a:solidFill>
+              </a14:hiddenFill>
+            </a:ext>
+            <a:ext uri="{91240B29-F687-4F45-9708-019B960494DF}">
+              <a14:hiddenLine xmlns:a14="http://schemas.microsoft.com/office/drawing/2010/main" xmlns="" w="9525">
+                <a:solidFill>
+                  <a:schemeClr val="tx1"/>
+                </a:solidFill>
+                <a:miter lim="800000"/>
+                <a:headEnd/>
+                <a:tailEnd/>
+              </a14:hiddenLine>
+            </a:ext>
+            <a:ext uri="{AF507438-7753-43E0-B8FC-AC1667EBCBE1}">
+              <a14:hiddenEffects xmlns:a14="http://schemas.microsoft.com/office/drawing/2010/main" xmlns="">
+                <a:effectLst>
+                  <a:outerShdw dist="35921" dir="2700000" algn="ctr" rotWithShape="0">
+                    <a:schemeClr val="bg2"/>
+                  </a:outerShdw>
+                </a:effectLst>
+              </a14:hiddenEffects>
+            </a:ext>
+          </a:extLst>
+        </p:spPr>
+        <p:txBody>
+          <a:bodyPr vert="horz" wrap="square" lIns="91440" tIns="45720" rIns="91440" bIns="45720" numCol="1" anchor="ctr" anchorCtr="0" compatLnSpc="1">
+            <a:prstTxWarp prst="textNoShape">
+              <a:avLst/>
+            </a:prstTxWarp>
+          </a:bodyPr>
+          <a:lstStyle/>
+          <a:p>
+            <a:pPr marL="0" marR="0" lvl="0" indent="0" algn="l" defTabSz="914400" rtl="0" eaLnBrk="1" fontAlgn="base" latinLnBrk="0" hangingPunct="1">
+              <a:lnSpc>
+                <a:spcPct val="100000"/>
+              </a:lnSpc>
+              <a:spcBef>
+                <a:spcPct val="0"/>
+              </a:spcBef>
+              <a:spcAft>
+                <a:spcPct val="0"/>
+              </a:spcAft>
+              <a:buClrTx/>
+              <a:buSzTx/>
+              <a:buFontTx/>
+              <a:buNone/>
+              <a:tabLst/>
+              <a:defRPr/>
+            </a:pPr>
+            <a:r>
+              <a:rPr kumimoji="0" lang="de-DE" sz="3600" b="1" i="0" u="none" strike="noStrike" kern="0" cap="none" spc="0" normalizeH="0" baseline="0" noProof="0" dirty="0" err="1" smtClean="0">
+                <a:ln>
+                  <a:noFill/>
+                </a:ln>
+                <a:solidFill>
+                  <a:schemeClr val="bg1"/>
+                </a:solidFill>
+                <a:effectLst/>
+                <a:uLnTx/>
+                <a:uFillTx/>
+                <a:latin typeface="+mj-lt"/>
+                <a:ea typeface="+mj-ea"/>
+                <a:cs typeface="+mj-cs"/>
+              </a:rPr>
+              <a:t>LoRaWAN</a:t>
+            </a:r>
+            <a:r>
+              <a:rPr kumimoji="0" lang="de-DE" sz="3600" b="1" i="0" u="none" strike="noStrike" kern="0" cap="none" spc="0" normalizeH="0" baseline="0" noProof="0" dirty="0" smtClean="0">
+                <a:ln>
+                  <a:noFill/>
+                </a:ln>
+                <a:solidFill>
+                  <a:schemeClr val="bg1"/>
+                </a:solidFill>
+                <a:effectLst/>
+                <a:uLnTx/>
+                <a:uFillTx/>
+                <a:latin typeface="+mj-lt"/>
+                <a:ea typeface="+mj-ea"/>
+                <a:cs typeface="+mj-cs"/>
+              </a:rPr>
+              <a:t> Projekt</a:t>
+            </a:r>
+            <a:br>
+              <a:rPr kumimoji="0" lang="de-DE" sz="3600" b="1" i="0" u="none" strike="noStrike" kern="0" cap="none" spc="0" normalizeH="0" baseline="0" noProof="0" dirty="0" smtClean="0">
+                <a:ln>
+                  <a:noFill/>
+                </a:ln>
+                <a:solidFill>
+                  <a:schemeClr val="bg1"/>
+                </a:solidFill>
+                <a:effectLst/>
+                <a:uLnTx/>
+                <a:uFillTx/>
+                <a:latin typeface="+mj-lt"/>
+                <a:ea typeface="+mj-ea"/>
+                <a:cs typeface="+mj-cs"/>
+              </a:rPr>
+            </a:br>
+            <a:r>
+              <a:rPr kumimoji="0" lang="de-DE" sz="3000" b="1" i="0" u="none" strike="noStrike" kern="0" cap="none" spc="0" normalizeH="0" baseline="0" noProof="0" dirty="0" smtClean="0">
+                <a:ln>
+                  <a:noFill/>
+                </a:ln>
+                <a:solidFill>
+                  <a:schemeClr val="bg1"/>
+                </a:solidFill>
+                <a:effectLst/>
+                <a:uLnTx/>
+                <a:uFillTx/>
+                <a:latin typeface="+mj-lt"/>
+                <a:ea typeface="+mj-ea"/>
+                <a:cs typeface="+mj-cs"/>
+              </a:rPr>
+              <a:t>Modul </a:t>
+            </a:r>
+            <a:r>
+              <a:rPr kumimoji="0" lang="de-DE" sz="3000" b="1" i="0" u="none" strike="noStrike" kern="0" cap="none" spc="0" normalizeH="0" baseline="0" noProof="0" dirty="0" err="1" smtClean="0">
+                <a:ln>
+                  <a:noFill/>
+                </a:ln>
+                <a:solidFill>
+                  <a:schemeClr val="bg1"/>
+                </a:solidFill>
+                <a:effectLst/>
+                <a:uLnTx/>
+                <a:uFillTx/>
+                <a:latin typeface="+mj-lt"/>
+                <a:ea typeface="+mj-ea"/>
+                <a:cs typeface="+mj-cs"/>
+              </a:rPr>
+              <a:t>Projektanagement</a:t>
+            </a:r>
+            <a:r>
+              <a:rPr kumimoji="0" lang="de-DE" sz="3000" b="1" i="0" u="none" strike="noStrike" kern="0" cap="none" spc="0" normalizeH="0" baseline="0" noProof="0" dirty="0" smtClean="0">
+                <a:ln>
+                  <a:noFill/>
+                </a:ln>
+                <a:solidFill>
+                  <a:schemeClr val="bg1"/>
+                </a:solidFill>
+                <a:effectLst/>
+                <a:uLnTx/>
+                <a:uFillTx/>
+                <a:latin typeface="+mj-lt"/>
+                <a:ea typeface="+mj-ea"/>
+                <a:cs typeface="+mj-cs"/>
+              </a:rPr>
+              <a:t/>
+            </a:r>
+            <a:br>
+              <a:rPr kumimoji="0" lang="de-DE" sz="3000" b="1" i="0" u="none" strike="noStrike" kern="0" cap="none" spc="0" normalizeH="0" baseline="0" noProof="0" dirty="0" smtClean="0">
+                <a:ln>
+                  <a:noFill/>
+                </a:ln>
+                <a:solidFill>
+                  <a:schemeClr val="bg1"/>
+                </a:solidFill>
+                <a:effectLst/>
+                <a:uLnTx/>
+                <a:uFillTx/>
+                <a:latin typeface="+mj-lt"/>
+                <a:ea typeface="+mj-ea"/>
+                <a:cs typeface="+mj-cs"/>
+              </a:rPr>
+            </a:br>
+            <a:r>
+              <a:rPr kumimoji="0" lang="de-DE" sz="2400" b="1" i="0" u="none" strike="noStrike" kern="0" cap="none" spc="0" normalizeH="0" baseline="0" noProof="0" dirty="0" smtClean="0">
+                <a:ln>
+                  <a:noFill/>
+                </a:ln>
+                <a:solidFill>
+                  <a:schemeClr val="bg1"/>
+                </a:solidFill>
+                <a:effectLst/>
+                <a:uLnTx/>
+                <a:uFillTx/>
+                <a:latin typeface="+mj-lt"/>
+                <a:ea typeface="+mj-ea"/>
+                <a:cs typeface="+mj-cs"/>
+              </a:rPr>
+              <a:t>Auftraggeber: Technologiestiftung Berlin</a:t>
+            </a:r>
+            <a:endParaRPr kumimoji="0" lang="de-DE" sz="2400" b="1" i="0" u="none" strike="noStrike" kern="0" cap="none" spc="0" normalizeH="0" baseline="0" noProof="0" dirty="0">
+              <a:ln>
+                <a:noFill/>
+              </a:ln>
+              <a:solidFill>
+                <a:schemeClr val="bg1"/>
+              </a:solidFill>
+              <a:effectLst/>
+              <a:uLnTx/>
+              <a:uFillTx/>
+              <a:latin typeface="+mj-lt"/>
+              <a:ea typeface="+mj-ea"/>
+              <a:cs typeface="+mj-cs"/>
+            </a:endParaRPr>
+          </a:p>
+        </p:txBody>
+      </p:sp>
     </p:spTree>
     <p:extLst>
       <p:ext uri="{BB962C8B-B14F-4D97-AF65-F5344CB8AC3E}">
-        <p14:creationId xmlns:p14="http://schemas.microsoft.com/office/powerpoint/2010/main" val="377435107"/>
+        <p14:creationId xmlns:p14="http://schemas.microsoft.com/office/powerpoint/2010/main" xmlns="" val="377435107"/>
       </p:ext>
     </p:extLst>
   </p:cSld>
   <p:clrMapOvr>
     <a:masterClrMapping/>
   </p:clrMapOvr>
-  <mc:AlternateContent xmlns:mc="http://schemas.openxmlformats.org/markup-compatibility/2006" xmlns:p14="http://schemas.microsoft.com/office/powerpoint/2010/main">
-    <mc:Choice Requires="p14">
+  <mc:AlternateContent xmlns:mc="http://schemas.openxmlformats.org/markup-compatibility/2006">
+    <mc:Choice xmlns:p14="http://schemas.microsoft.com/office/powerpoint/2010/main" xmlns="" Requires="p14">
       <p:transition spd="slow" p14:dur="2000"/>
     </mc:Choice>
-    <mc:Fallback xmlns="">
+    <mc:Fallback>
       <p:transition spd="slow"/>
     </mc:Fallback>
   </mc:AlternateContent>
@@ -4723,10 +4899,10 @@
           <p:nvPr/>
         </p:nvPicPr>
         <p:blipFill>
-          <a:blip r:embed="rId2">
+          <a:blip r:embed="rId2" cstate="print">
             <a:extLst>
               <a:ext uri="{28A0092B-C50C-407E-A947-70E740481C1C}">
-                <a14:useLocalDpi xmlns:a14="http://schemas.microsoft.com/office/drawing/2010/main" val="0"/>
+                <a14:useLocalDpi xmlns:a14="http://schemas.microsoft.com/office/drawing/2010/main" xmlns="" val="0"/>
               </a:ext>
             </a:extLst>
           </a:blip>
@@ -4756,7 +4932,7 @@
           <a:blip r:embed="rId3" cstate="print">
             <a:extLst>
               <a:ext uri="{28A0092B-C50C-407E-A947-70E740481C1C}">
-                <a14:useLocalDpi xmlns:a14="http://schemas.microsoft.com/office/drawing/2010/main" val="0"/>
+                <a14:useLocalDpi xmlns:a14="http://schemas.microsoft.com/office/drawing/2010/main" xmlns="" val="0"/>
               </a:ext>
             </a:extLst>
           </a:blip>
@@ -4786,7 +4962,7 @@
           <a:blip r:embed="rId4" cstate="print">
             <a:extLst>
               <a:ext uri="{28A0092B-C50C-407E-A947-70E740481C1C}">
-                <a14:useLocalDpi xmlns:a14="http://schemas.microsoft.com/office/drawing/2010/main" val="0"/>
+                <a14:useLocalDpi xmlns:a14="http://schemas.microsoft.com/office/drawing/2010/main" xmlns="" val="0"/>
               </a:ext>
             </a:extLst>
           </a:blip>
@@ -4816,7 +4992,7 @@
           <a:blip r:embed="rId5" cstate="print">
             <a:extLst>
               <a:ext uri="{28A0092B-C50C-407E-A947-70E740481C1C}">
-                <a14:useLocalDpi xmlns:a14="http://schemas.microsoft.com/office/drawing/2010/main" val="0"/>
+                <a14:useLocalDpi xmlns:a14="http://schemas.microsoft.com/office/drawing/2010/main" xmlns="" val="0"/>
               </a:ext>
             </a:extLst>
           </a:blip>
@@ -4843,10 +5019,10 @@
           <p:nvPr/>
         </p:nvPicPr>
         <p:blipFill>
-          <a:blip r:embed="rId6">
+          <a:blip r:embed="rId6" cstate="print">
             <a:extLst>
               <a:ext uri="{28A0092B-C50C-407E-A947-70E740481C1C}">
-                <a14:useLocalDpi xmlns:a14="http://schemas.microsoft.com/office/drawing/2010/main" val="0"/>
+                <a14:useLocalDpi xmlns:a14="http://schemas.microsoft.com/office/drawing/2010/main" xmlns="" val="0"/>
               </a:ext>
             </a:extLst>
           </a:blip>

</xml_diff>

<commit_message>
Added footer to presentation
</commit_message>
<xml_diff>
--- a/doc/Praesentation_Meeting_13.06.2017.pptx
+++ b/doc/Praesentation_Meeting_13.06.2017.pptx
@@ -148,7 +148,7 @@
   </p:defaultTextStyle>
   <p:extLst>
     <p:ext uri="{EFAFB233-063F-42B5-8137-9DF3F51BA10A}">
-      <p15:sldGuideLst xmlns:p15="http://schemas.microsoft.com/office/powerpoint/2012/main" xmlns="">
+      <p15:sldGuideLst xmlns="" xmlns:p15="http://schemas.microsoft.com/office/powerpoint/2012/main">
         <p15:guide id="1" orient="horz">
           <p15:clr>
             <a:srgbClr val="A4A3A4"/>
@@ -162,7 +162,7 @@
       </p15:sldGuideLst>
     </p:ext>
     <p:ext uri="{2D200454-40CA-4A62-9FC3-DE9A4176ACB9}">
-      <p15:notesGuideLst xmlns:p15="http://schemas.microsoft.com/office/powerpoint/2012/main" xmlns="">
+      <p15:notesGuideLst xmlns="" xmlns:p15="http://schemas.microsoft.com/office/powerpoint/2012/main">
         <p15:guide id="1" orient="horz" pos="2140">
           <p15:clr>
             <a:srgbClr val="A4A3A4"/>
@@ -229,14 +229,14 @@
           <a:effectLst/>
           <a:extLst>
             <a:ext uri="{909E8E84-426E-40DD-AFC4-6F175D3DCCD1}">
-              <a14:hiddenFill xmlns:a14="http://schemas.microsoft.com/office/drawing/2010/main" xmlns="">
+              <a14:hiddenFill xmlns="" xmlns:a14="http://schemas.microsoft.com/office/drawing/2010/main">
                 <a:solidFill>
                   <a:schemeClr val="accent1"/>
                 </a:solidFill>
               </a14:hiddenFill>
             </a:ext>
             <a:ext uri="{91240B29-F687-4F45-9708-019B960494DF}">
-              <a14:hiddenLine xmlns:a14="http://schemas.microsoft.com/office/drawing/2010/main" xmlns="" w="9525">
+              <a14:hiddenLine xmlns="" xmlns:a14="http://schemas.microsoft.com/office/drawing/2010/main" w="9525">
                 <a:solidFill>
                   <a:schemeClr val="tx1"/>
                 </a:solidFill>
@@ -246,7 +246,7 @@
               </a14:hiddenLine>
             </a:ext>
             <a:ext uri="{AF507438-7753-43E0-B8FC-AC1667EBCBE1}">
-              <a14:hiddenEffects xmlns:a14="http://schemas.microsoft.com/office/drawing/2010/main" xmlns="">
+              <a14:hiddenEffects xmlns="" xmlns:a14="http://schemas.microsoft.com/office/drawing/2010/main">
                 <a:effectLst>
                   <a:outerShdw dist="35921" dir="2700000" algn="ctr" rotWithShape="0">
                     <a:schemeClr val="bg2"/>
@@ -300,14 +300,14 @@
           <a:effectLst/>
           <a:extLst>
             <a:ext uri="{909E8E84-426E-40DD-AFC4-6F175D3DCCD1}">
-              <a14:hiddenFill xmlns:a14="http://schemas.microsoft.com/office/drawing/2010/main" xmlns="">
+              <a14:hiddenFill xmlns="" xmlns:a14="http://schemas.microsoft.com/office/drawing/2010/main">
                 <a:solidFill>
                   <a:schemeClr val="accent1"/>
                 </a:solidFill>
               </a14:hiddenFill>
             </a:ext>
             <a:ext uri="{91240B29-F687-4F45-9708-019B960494DF}">
-              <a14:hiddenLine xmlns:a14="http://schemas.microsoft.com/office/drawing/2010/main" xmlns="" w="9525">
+              <a14:hiddenLine xmlns="" xmlns:a14="http://schemas.microsoft.com/office/drawing/2010/main" w="9525">
                 <a:solidFill>
                   <a:schemeClr val="tx1"/>
                 </a:solidFill>
@@ -317,7 +317,7 @@
               </a14:hiddenLine>
             </a:ext>
             <a:ext uri="{AF507438-7753-43E0-B8FC-AC1667EBCBE1}">
-              <a14:hiddenEffects xmlns:a14="http://schemas.microsoft.com/office/drawing/2010/main" xmlns="">
+              <a14:hiddenEffects xmlns="" xmlns:a14="http://schemas.microsoft.com/office/drawing/2010/main">
                 <a:effectLst>
                   <a:outerShdw dist="35921" dir="2700000" algn="ctr" rotWithShape="0">
                     <a:schemeClr val="bg2"/>
@@ -371,14 +371,14 @@
           <a:effectLst/>
           <a:extLst>
             <a:ext uri="{909E8E84-426E-40DD-AFC4-6F175D3DCCD1}">
-              <a14:hiddenFill xmlns:a14="http://schemas.microsoft.com/office/drawing/2010/main" xmlns="">
+              <a14:hiddenFill xmlns="" xmlns:a14="http://schemas.microsoft.com/office/drawing/2010/main">
                 <a:solidFill>
                   <a:schemeClr val="accent1"/>
                 </a:solidFill>
               </a14:hiddenFill>
             </a:ext>
             <a:ext uri="{91240B29-F687-4F45-9708-019B960494DF}">
-              <a14:hiddenLine xmlns:a14="http://schemas.microsoft.com/office/drawing/2010/main" xmlns="" w="9525">
+              <a14:hiddenLine xmlns="" xmlns:a14="http://schemas.microsoft.com/office/drawing/2010/main" w="9525">
                 <a:solidFill>
                   <a:schemeClr val="tx1"/>
                 </a:solidFill>
@@ -388,7 +388,7 @@
               </a14:hiddenLine>
             </a:ext>
             <a:ext uri="{AF507438-7753-43E0-B8FC-AC1667EBCBE1}">
-              <a14:hiddenEffects xmlns:a14="http://schemas.microsoft.com/office/drawing/2010/main" xmlns="">
+              <a14:hiddenEffects xmlns="" xmlns:a14="http://schemas.microsoft.com/office/drawing/2010/main">
                 <a:effectLst>
                   <a:outerShdw dist="35921" dir="2700000" algn="ctr" rotWithShape="0">
                     <a:schemeClr val="bg2"/>
@@ -442,14 +442,14 @@
           <a:effectLst/>
           <a:extLst>
             <a:ext uri="{909E8E84-426E-40DD-AFC4-6F175D3DCCD1}">
-              <a14:hiddenFill xmlns:a14="http://schemas.microsoft.com/office/drawing/2010/main" xmlns="">
+              <a14:hiddenFill xmlns="" xmlns:a14="http://schemas.microsoft.com/office/drawing/2010/main">
                 <a:solidFill>
                   <a:schemeClr val="accent1"/>
                 </a:solidFill>
               </a14:hiddenFill>
             </a:ext>
             <a:ext uri="{91240B29-F687-4F45-9708-019B960494DF}">
-              <a14:hiddenLine xmlns:a14="http://schemas.microsoft.com/office/drawing/2010/main" xmlns="" w="9525">
+              <a14:hiddenLine xmlns="" xmlns:a14="http://schemas.microsoft.com/office/drawing/2010/main" w="9525">
                 <a:solidFill>
                   <a:schemeClr val="tx1"/>
                 </a:solidFill>
@@ -459,7 +459,7 @@
               </a14:hiddenLine>
             </a:ext>
             <a:ext uri="{AF507438-7753-43E0-B8FC-AC1667EBCBE1}">
-              <a14:hiddenEffects xmlns:a14="http://schemas.microsoft.com/office/drawing/2010/main" xmlns="">
+              <a14:hiddenEffects xmlns="" xmlns:a14="http://schemas.microsoft.com/office/drawing/2010/main">
                 <a:effectLst>
                   <a:outerShdw dist="35921" dir="2700000" algn="ctr" rotWithShape="0">
                     <a:schemeClr val="bg2"/>
@@ -498,7 +498,7 @@
     </p:spTree>
     <p:extLst>
       <p:ext uri="{BB962C8B-B14F-4D97-AF65-F5344CB8AC3E}">
-        <p14:creationId xmlns:p14="http://schemas.microsoft.com/office/powerpoint/2010/main" xmlns="" val="1669010643"/>
+        <p14:creationId xmlns="" xmlns:p14="http://schemas.microsoft.com/office/powerpoint/2010/main" val="1669010643"/>
       </p:ext>
     </p:extLst>
   </p:cSld>
@@ -556,14 +556,14 @@
           <a:effectLst/>
           <a:extLst>
             <a:ext uri="{909E8E84-426E-40DD-AFC4-6F175D3DCCD1}">
-              <a14:hiddenFill xmlns:a14="http://schemas.microsoft.com/office/drawing/2010/main" xmlns="">
+              <a14:hiddenFill xmlns="" xmlns:a14="http://schemas.microsoft.com/office/drawing/2010/main">
                 <a:solidFill>
                   <a:schemeClr val="accent1"/>
                 </a:solidFill>
               </a14:hiddenFill>
             </a:ext>
             <a:ext uri="{91240B29-F687-4F45-9708-019B960494DF}">
-              <a14:hiddenLine xmlns:a14="http://schemas.microsoft.com/office/drawing/2010/main" xmlns="" w="9525">
+              <a14:hiddenLine xmlns="" xmlns:a14="http://schemas.microsoft.com/office/drawing/2010/main" w="9525">
                 <a:solidFill>
                   <a:schemeClr val="tx1"/>
                 </a:solidFill>
@@ -573,7 +573,7 @@
               </a14:hiddenLine>
             </a:ext>
             <a:ext uri="{AF507438-7753-43E0-B8FC-AC1667EBCBE1}">
-              <a14:hiddenEffects xmlns:a14="http://schemas.microsoft.com/office/drawing/2010/main" xmlns="">
+              <a14:hiddenEffects xmlns="" xmlns:a14="http://schemas.microsoft.com/office/drawing/2010/main">
                 <a:effectLst>
                   <a:outerShdw dist="35921" dir="2700000" algn="ctr" rotWithShape="0">
                     <a:schemeClr val="bg2"/>
@@ -627,14 +627,14 @@
           <a:effectLst/>
           <a:extLst>
             <a:ext uri="{909E8E84-426E-40DD-AFC4-6F175D3DCCD1}">
-              <a14:hiddenFill xmlns:a14="http://schemas.microsoft.com/office/drawing/2010/main" xmlns="">
+              <a14:hiddenFill xmlns="" xmlns:a14="http://schemas.microsoft.com/office/drawing/2010/main">
                 <a:solidFill>
                   <a:schemeClr val="accent1"/>
                 </a:solidFill>
               </a14:hiddenFill>
             </a:ext>
             <a:ext uri="{91240B29-F687-4F45-9708-019B960494DF}">
-              <a14:hiddenLine xmlns:a14="http://schemas.microsoft.com/office/drawing/2010/main" xmlns="" w="9525">
+              <a14:hiddenLine xmlns="" xmlns:a14="http://schemas.microsoft.com/office/drawing/2010/main" w="9525">
                 <a:solidFill>
                   <a:schemeClr val="tx1"/>
                 </a:solidFill>
@@ -644,7 +644,7 @@
               </a14:hiddenLine>
             </a:ext>
             <a:ext uri="{AF507438-7753-43E0-B8FC-AC1667EBCBE1}">
-              <a14:hiddenEffects xmlns:a14="http://schemas.microsoft.com/office/drawing/2010/main" xmlns="">
+              <a14:hiddenEffects xmlns="" xmlns:a14="http://schemas.microsoft.com/office/drawing/2010/main">
                 <a:effectLst>
                   <a:outerShdw dist="35921" dir="2700000" algn="ctr" rotWithShape="0">
                     <a:schemeClr val="bg2"/>
@@ -703,14 +703,14 @@
           <a:effectLst/>
           <a:extLst>
             <a:ext uri="{909E8E84-426E-40DD-AFC4-6F175D3DCCD1}">
-              <a14:hiddenFill xmlns:a14="http://schemas.microsoft.com/office/drawing/2010/main" xmlns="">
+              <a14:hiddenFill xmlns="" xmlns:a14="http://schemas.microsoft.com/office/drawing/2010/main">
                 <a:solidFill>
                   <a:srgbClr val="FFFFFF"/>
                 </a:solidFill>
               </a14:hiddenFill>
             </a:ext>
             <a:ext uri="{AF507438-7753-43E0-B8FC-AC1667EBCBE1}">
-              <a14:hiddenEffects xmlns:a14="http://schemas.microsoft.com/office/drawing/2010/main" xmlns="">
+              <a14:hiddenEffects xmlns="" xmlns:a14="http://schemas.microsoft.com/office/drawing/2010/main">
                 <a:effectLst>
                   <a:outerShdw dist="35921" dir="2700000" algn="ctr" rotWithShape="0">
                     <a:srgbClr val="808080"/>
@@ -719,7 +719,7 @@
               </a14:hiddenEffects>
             </a:ext>
             <a:ext uri="{53640926-AAD7-44D8-BBD7-CCE9431645EC}">
-              <a14:shadowObscured xmlns:a14="http://schemas.microsoft.com/office/drawing/2010/main" xmlns="" val="1"/>
+              <a14:shadowObscured xmlns="" xmlns:a14="http://schemas.microsoft.com/office/drawing/2010/main" val="1"/>
             </a:ext>
           </a:extLst>
         </p:spPr>
@@ -749,14 +749,14 @@
           <a:effectLst/>
           <a:extLst>
             <a:ext uri="{909E8E84-426E-40DD-AFC4-6F175D3DCCD1}">
-              <a14:hiddenFill xmlns:a14="http://schemas.microsoft.com/office/drawing/2010/main" xmlns="">
+              <a14:hiddenFill xmlns="" xmlns:a14="http://schemas.microsoft.com/office/drawing/2010/main">
                 <a:solidFill>
                   <a:schemeClr val="accent1"/>
                 </a:solidFill>
               </a14:hiddenFill>
             </a:ext>
             <a:ext uri="{91240B29-F687-4F45-9708-019B960494DF}">
-              <a14:hiddenLine xmlns:a14="http://schemas.microsoft.com/office/drawing/2010/main" xmlns="" w="9525">
+              <a14:hiddenLine xmlns="" xmlns:a14="http://schemas.microsoft.com/office/drawing/2010/main" w="9525">
                 <a:solidFill>
                   <a:schemeClr val="tx1"/>
                 </a:solidFill>
@@ -766,7 +766,7 @@
               </a14:hiddenLine>
             </a:ext>
             <a:ext uri="{AF507438-7753-43E0-B8FC-AC1667EBCBE1}">
-              <a14:hiddenEffects xmlns:a14="http://schemas.microsoft.com/office/drawing/2010/main" xmlns="">
+              <a14:hiddenEffects xmlns="" xmlns:a14="http://schemas.microsoft.com/office/drawing/2010/main">
                 <a:effectLst>
                   <a:outerShdw dist="35921" dir="2700000" algn="ctr" rotWithShape="0">
                     <a:schemeClr val="bg2"/>
@@ -845,14 +845,14 @@
           <a:effectLst/>
           <a:extLst>
             <a:ext uri="{909E8E84-426E-40DD-AFC4-6F175D3DCCD1}">
-              <a14:hiddenFill xmlns:a14="http://schemas.microsoft.com/office/drawing/2010/main" xmlns="">
+              <a14:hiddenFill xmlns="" xmlns:a14="http://schemas.microsoft.com/office/drawing/2010/main">
                 <a:solidFill>
                   <a:schemeClr val="accent1"/>
                 </a:solidFill>
               </a14:hiddenFill>
             </a:ext>
             <a:ext uri="{91240B29-F687-4F45-9708-019B960494DF}">
-              <a14:hiddenLine xmlns:a14="http://schemas.microsoft.com/office/drawing/2010/main" xmlns="" w="9525">
+              <a14:hiddenLine xmlns="" xmlns:a14="http://schemas.microsoft.com/office/drawing/2010/main" w="9525">
                 <a:solidFill>
                   <a:schemeClr val="tx1"/>
                 </a:solidFill>
@@ -862,7 +862,7 @@
               </a14:hiddenLine>
             </a:ext>
             <a:ext uri="{AF507438-7753-43E0-B8FC-AC1667EBCBE1}">
-              <a14:hiddenEffects xmlns:a14="http://schemas.microsoft.com/office/drawing/2010/main" xmlns="">
+              <a14:hiddenEffects xmlns="" xmlns:a14="http://schemas.microsoft.com/office/drawing/2010/main">
                 <a:effectLst>
                   <a:outerShdw dist="35921" dir="2700000" algn="ctr" rotWithShape="0">
                     <a:schemeClr val="bg2"/>
@@ -916,14 +916,14 @@
           <a:effectLst/>
           <a:extLst>
             <a:ext uri="{909E8E84-426E-40DD-AFC4-6F175D3DCCD1}">
-              <a14:hiddenFill xmlns:a14="http://schemas.microsoft.com/office/drawing/2010/main" xmlns="">
+              <a14:hiddenFill xmlns="" xmlns:a14="http://schemas.microsoft.com/office/drawing/2010/main">
                 <a:solidFill>
                   <a:schemeClr val="accent1"/>
                 </a:solidFill>
               </a14:hiddenFill>
             </a:ext>
             <a:ext uri="{91240B29-F687-4F45-9708-019B960494DF}">
-              <a14:hiddenLine xmlns:a14="http://schemas.microsoft.com/office/drawing/2010/main" xmlns="" w="9525">
+              <a14:hiddenLine xmlns="" xmlns:a14="http://schemas.microsoft.com/office/drawing/2010/main" w="9525">
                 <a:solidFill>
                   <a:schemeClr val="tx1"/>
                 </a:solidFill>
@@ -933,7 +933,7 @@
               </a14:hiddenLine>
             </a:ext>
             <a:ext uri="{AF507438-7753-43E0-B8FC-AC1667EBCBE1}">
-              <a14:hiddenEffects xmlns:a14="http://schemas.microsoft.com/office/drawing/2010/main" xmlns="">
+              <a14:hiddenEffects xmlns="" xmlns:a14="http://schemas.microsoft.com/office/drawing/2010/main">
                 <a:effectLst>
                   <a:outerShdw dist="35921" dir="2700000" algn="ctr" rotWithShape="0">
                     <a:schemeClr val="bg2"/>
@@ -972,7 +972,7 @@
     </p:spTree>
     <p:extLst>
       <p:ext uri="{BB962C8B-B14F-4D97-AF65-F5344CB8AC3E}">
-        <p14:creationId xmlns:p14="http://schemas.microsoft.com/office/powerpoint/2010/main" xmlns="" val="4094411869"/>
+        <p14:creationId xmlns="" xmlns:p14="http://schemas.microsoft.com/office/powerpoint/2010/main" val="4094411869"/>
       </p:ext>
     </p:extLst>
   </p:cSld>
@@ -1131,7 +1131,7 @@
           <a:blip r:embed="rId2" cstate="print">
             <a:extLst>
               <a:ext uri="{28A0092B-C50C-407E-A947-70E740481C1C}">
-                <a14:useLocalDpi xmlns:a14="http://schemas.microsoft.com/office/drawing/2010/main" xmlns="" val="0"/>
+                <a14:useLocalDpi xmlns="" xmlns:a14="http://schemas.microsoft.com/office/drawing/2010/main" val="0"/>
               </a:ext>
             </a:extLst>
           </a:blip>
@@ -1150,7 +1150,7 @@
           <a:noFill/>
           <a:extLst>
             <a:ext uri="{909E8E84-426E-40DD-AFC4-6F175D3DCCD1}">
-              <a14:hiddenFill xmlns:a14="http://schemas.microsoft.com/office/drawing/2010/main" xmlns="">
+              <a14:hiddenFill xmlns="" xmlns:a14="http://schemas.microsoft.com/office/drawing/2010/main">
                 <a:solidFill>
                   <a:srgbClr val="FFFFFF"/>
                 </a:solidFill>
@@ -1171,7 +1171,7 @@
           <a:blip r:embed="rId3" cstate="email">
             <a:extLst>
               <a:ext uri="{28A0092B-C50C-407E-A947-70E740481C1C}">
-                <a14:useLocalDpi xmlns:a14="http://schemas.microsoft.com/office/drawing/2010/main" xmlns=""/>
+                <a14:useLocalDpi xmlns="" xmlns:a14="http://schemas.microsoft.com/office/drawing/2010/main"/>
               </a:ext>
             </a:extLst>
           </a:blip>
@@ -1193,14 +1193,14 @@
           <a:effectLst/>
           <a:extLst>
             <a:ext uri="{909E8E84-426E-40DD-AFC4-6F175D3DCCD1}">
-              <a14:hiddenFill xmlns:a14="http://schemas.microsoft.com/office/drawing/2010/main" xmlns="">
+              <a14:hiddenFill xmlns="" xmlns:a14="http://schemas.microsoft.com/office/drawing/2010/main">
                 <a:solidFill>
                   <a:schemeClr val="accent1"/>
                 </a:solidFill>
               </a14:hiddenFill>
             </a:ext>
             <a:ext uri="{91240B29-F687-4F45-9708-019B960494DF}">
-              <a14:hiddenLine xmlns:a14="http://schemas.microsoft.com/office/drawing/2010/main" xmlns="" w="9525">
+              <a14:hiddenLine xmlns="" xmlns:a14="http://schemas.microsoft.com/office/drawing/2010/main" w="9525">
                 <a:solidFill>
                   <a:schemeClr val="tx1"/>
                 </a:solidFill>
@@ -1210,7 +1210,7 @@
               </a14:hiddenLine>
             </a:ext>
             <a:ext uri="{AF507438-7753-43E0-B8FC-AC1667EBCBE1}">
-              <a14:hiddenEffects xmlns:a14="http://schemas.microsoft.com/office/drawing/2010/main" xmlns="">
+              <a14:hiddenEffects xmlns="" xmlns:a14="http://schemas.microsoft.com/office/drawing/2010/main">
                 <a:effectLst>
                   <a:outerShdw dist="35921" dir="2700000" algn="ctr" rotWithShape="0">
                     <a:schemeClr val="bg2"/>
@@ -1287,14 +1287,14 @@
           <a:noFill/>
           <a:extLst>
             <a:ext uri="{909E8E84-426E-40DD-AFC4-6F175D3DCCD1}">
-              <a14:hiddenFill xmlns:a14="http://schemas.microsoft.com/office/drawing/2010/main" xmlns="">
+              <a14:hiddenFill xmlns="" xmlns:a14="http://schemas.microsoft.com/office/drawing/2010/main">
                 <a:solidFill>
                   <a:schemeClr val="accent1"/>
                 </a:solidFill>
               </a14:hiddenFill>
             </a:ext>
             <a:ext uri="{91240B29-F687-4F45-9708-019B960494DF}">
-              <a14:hiddenLine xmlns:a14="http://schemas.microsoft.com/office/drawing/2010/main" xmlns="" w="9525">
+              <a14:hiddenLine xmlns="" xmlns:a14="http://schemas.microsoft.com/office/drawing/2010/main" w="9525">
                 <a:solidFill>
                   <a:schemeClr val="tx1"/>
                 </a:solidFill>
@@ -1304,7 +1304,7 @@
               </a14:hiddenLine>
             </a:ext>
             <a:ext uri="{AF507438-7753-43E0-B8FC-AC1667EBCBE1}">
-              <a14:hiddenEffects xmlns:a14="http://schemas.microsoft.com/office/drawing/2010/main" xmlns="">
+              <a14:hiddenEffects xmlns="" xmlns:a14="http://schemas.microsoft.com/office/drawing/2010/main">
                 <a:effectLst>
                   <a:outerShdw dist="35921" dir="2700000" algn="ctr" rotWithShape="0">
                     <a:schemeClr val="bg2"/>
@@ -1615,7 +1615,7 @@
           <a:effectLst/>
           <a:extLst>
             <a:ext uri="{91240B29-F687-4F45-9708-019B960494DF}">
-              <a14:hiddenLine xmlns:a14="http://schemas.microsoft.com/office/drawing/2010/main" xmlns="" w="9525">
+              <a14:hiddenLine xmlns="" xmlns:a14="http://schemas.microsoft.com/office/drawing/2010/main" w="9525">
                 <a:solidFill>
                   <a:schemeClr val="tx1"/>
                 </a:solidFill>
@@ -1625,7 +1625,7 @@
               </a14:hiddenLine>
             </a:ext>
             <a:ext uri="{AF507438-7753-43E0-B8FC-AC1667EBCBE1}">
-              <a14:hiddenEffects xmlns:a14="http://schemas.microsoft.com/office/drawing/2010/main" xmlns="">
+              <a14:hiddenEffects xmlns="" xmlns:a14="http://schemas.microsoft.com/office/drawing/2010/main">
                 <a:effectLst>
                   <a:outerShdw dist="35921" dir="2700000" algn="ctr" rotWithShape="0">
                     <a:schemeClr val="bg2"/>
@@ -1833,7 +1833,7 @@
           <a:effectLst/>
           <a:extLst>
             <a:ext uri="{91240B29-F687-4F45-9708-019B960494DF}">
-              <a14:hiddenLine xmlns:a14="http://schemas.microsoft.com/office/drawing/2010/main" xmlns="" w="9525">
+              <a14:hiddenLine xmlns="" xmlns:a14="http://schemas.microsoft.com/office/drawing/2010/main" w="9525">
                 <a:solidFill>
                   <a:schemeClr val="tx1"/>
                 </a:solidFill>
@@ -1843,7 +1843,7 @@
               </a14:hiddenLine>
             </a:ext>
             <a:ext uri="{AF507438-7753-43E0-B8FC-AC1667EBCBE1}">
-              <a14:hiddenEffects xmlns:a14="http://schemas.microsoft.com/office/drawing/2010/main" xmlns="">
+              <a14:hiddenEffects xmlns="" xmlns:a14="http://schemas.microsoft.com/office/drawing/2010/main">
                 <a:effectLst>
                   <a:outerShdw dist="35921" dir="2700000" algn="ctr" rotWithShape="0">
                     <a:schemeClr val="bg2"/>
@@ -2029,7 +2029,7 @@
     </p:spTree>
     <p:extLst>
       <p:ext uri="{BB962C8B-B14F-4D97-AF65-F5344CB8AC3E}">
-        <p14:creationId xmlns:p14="http://schemas.microsoft.com/office/powerpoint/2010/main" xmlns="" val="3997811741"/>
+        <p14:creationId xmlns="" xmlns:p14="http://schemas.microsoft.com/office/powerpoint/2010/main" val="3997811741"/>
       </p:ext>
     </p:extLst>
   </p:cSld>
@@ -2330,7 +2330,7 @@
     </p:spTree>
     <p:extLst>
       <p:ext uri="{BB962C8B-B14F-4D97-AF65-F5344CB8AC3E}">
-        <p14:creationId xmlns:p14="http://schemas.microsoft.com/office/powerpoint/2010/main" xmlns="" val="381220797"/>
+        <p14:creationId xmlns="" xmlns:p14="http://schemas.microsoft.com/office/powerpoint/2010/main" val="381220797"/>
       </p:ext>
     </p:extLst>
   </p:cSld>
@@ -2627,7 +2627,7 @@
     </p:spTree>
     <p:extLst>
       <p:ext uri="{BB962C8B-B14F-4D97-AF65-F5344CB8AC3E}">
-        <p14:creationId xmlns:p14="http://schemas.microsoft.com/office/powerpoint/2010/main" xmlns="" val="740450729"/>
+        <p14:creationId xmlns="" xmlns:p14="http://schemas.microsoft.com/office/powerpoint/2010/main" val="740450729"/>
       </p:ext>
     </p:extLst>
   </p:cSld>
@@ -2924,7 +2924,7 @@
     </p:spTree>
     <p:extLst>
       <p:ext uri="{BB962C8B-B14F-4D97-AF65-F5344CB8AC3E}">
-        <p14:creationId xmlns:p14="http://schemas.microsoft.com/office/powerpoint/2010/main" xmlns="" val="1462842395"/>
+        <p14:creationId xmlns="" xmlns:p14="http://schemas.microsoft.com/office/powerpoint/2010/main" val="1462842395"/>
       </p:ext>
     </p:extLst>
   </p:cSld>
@@ -3151,7 +3151,7 @@
     </p:spTree>
     <p:extLst>
       <p:ext uri="{BB962C8B-B14F-4D97-AF65-F5344CB8AC3E}">
-        <p14:creationId xmlns:p14="http://schemas.microsoft.com/office/powerpoint/2010/main" xmlns="" val="1106715229"/>
+        <p14:creationId xmlns="" xmlns:p14="http://schemas.microsoft.com/office/powerpoint/2010/main" val="1106715229"/>
       </p:ext>
     </p:extLst>
   </p:cSld>
@@ -3471,7 +3471,7 @@
     </p:spTree>
     <p:extLst>
       <p:ext uri="{BB962C8B-B14F-4D97-AF65-F5344CB8AC3E}">
-        <p14:creationId xmlns:p14="http://schemas.microsoft.com/office/powerpoint/2010/main" xmlns="" val="1233670126"/>
+        <p14:creationId xmlns="" xmlns:p14="http://schemas.microsoft.com/office/powerpoint/2010/main" val="1233670126"/>
       </p:ext>
     </p:extLst>
   </p:cSld>
@@ -3553,7 +3553,7 @@
           <a:blip r:embed="rId8" cstate="email">
             <a:extLst>
               <a:ext uri="{28A0092B-C50C-407E-A947-70E740481C1C}">
-                <a14:useLocalDpi xmlns:a14="http://schemas.microsoft.com/office/drawing/2010/main" xmlns=""/>
+                <a14:useLocalDpi xmlns="" xmlns:a14="http://schemas.microsoft.com/office/drawing/2010/main"/>
               </a:ext>
             </a:extLst>
           </a:blip>
@@ -3571,7 +3571,7 @@
           <a:noFill/>
           <a:extLst>
             <a:ext uri="{909E8E84-426E-40DD-AFC4-6F175D3DCCD1}">
-              <a14:hiddenFill xmlns:a14="http://schemas.microsoft.com/office/drawing/2010/main" xmlns="">
+              <a14:hiddenFill xmlns="" xmlns:a14="http://schemas.microsoft.com/office/drawing/2010/main">
                 <a:solidFill>
                   <a:srgbClr val="FFFFFF"/>
                 </a:solidFill>
@@ -3605,14 +3605,14 @@
           <a:effectLst/>
           <a:extLst>
             <a:ext uri="{909E8E84-426E-40DD-AFC4-6F175D3DCCD1}">
-              <a14:hiddenFill xmlns:a14="http://schemas.microsoft.com/office/drawing/2010/main" xmlns="">
+              <a14:hiddenFill xmlns="" xmlns:a14="http://schemas.microsoft.com/office/drawing/2010/main">
                 <a:solidFill>
                   <a:schemeClr val="accent1"/>
                 </a:solidFill>
               </a14:hiddenFill>
             </a:ext>
             <a:ext uri="{91240B29-F687-4F45-9708-019B960494DF}">
-              <a14:hiddenLine xmlns:a14="http://schemas.microsoft.com/office/drawing/2010/main" xmlns="" w="9525">
+              <a14:hiddenLine xmlns="" xmlns:a14="http://schemas.microsoft.com/office/drawing/2010/main" w="9525">
                 <a:solidFill>
                   <a:schemeClr val="tx1"/>
                 </a:solidFill>
@@ -3622,7 +3622,7 @@
               </a14:hiddenLine>
             </a:ext>
             <a:ext uri="{AF507438-7753-43E0-B8FC-AC1667EBCBE1}">
-              <a14:hiddenEffects xmlns:a14="http://schemas.microsoft.com/office/drawing/2010/main" xmlns="">
+              <a14:hiddenEffects xmlns="" xmlns:a14="http://schemas.microsoft.com/office/drawing/2010/main">
                 <a:effectLst>
                   <a:outerShdw dist="35921" dir="2700000" algn="ctr" rotWithShape="0">
                     <a:schemeClr val="bg2"/>
@@ -3685,14 +3685,14 @@
           <a:effectLst/>
           <a:extLst>
             <a:ext uri="{909E8E84-426E-40DD-AFC4-6F175D3DCCD1}">
-              <a14:hiddenFill xmlns:a14="http://schemas.microsoft.com/office/drawing/2010/main" xmlns="">
+              <a14:hiddenFill xmlns="" xmlns:a14="http://schemas.microsoft.com/office/drawing/2010/main">
                 <a:solidFill>
                   <a:schemeClr val="accent1"/>
                 </a:solidFill>
               </a14:hiddenFill>
             </a:ext>
             <a:ext uri="{91240B29-F687-4F45-9708-019B960494DF}">
-              <a14:hiddenLine xmlns:a14="http://schemas.microsoft.com/office/drawing/2010/main" xmlns="" w="9525">
+              <a14:hiddenLine xmlns="" xmlns:a14="http://schemas.microsoft.com/office/drawing/2010/main" w="9525">
                 <a:solidFill>
                   <a:schemeClr val="tx1"/>
                 </a:solidFill>
@@ -3702,7 +3702,7 @@
               </a14:hiddenLine>
             </a:ext>
             <a:ext uri="{AF507438-7753-43E0-B8FC-AC1667EBCBE1}">
-              <a14:hiddenEffects xmlns:a14="http://schemas.microsoft.com/office/drawing/2010/main" xmlns="">
+              <a14:hiddenEffects xmlns="" xmlns:a14="http://schemas.microsoft.com/office/drawing/2010/main">
                 <a:effectLst>
                   <a:outerShdw dist="35921" dir="2700000" algn="ctr" rotWithShape="0">
                     <a:schemeClr val="bg2"/>
@@ -3755,7 +3755,7 @@
           <a:blip r:embed="rId8" cstate="email">
             <a:extLst>
               <a:ext uri="{28A0092B-C50C-407E-A947-70E740481C1C}">
-                <a14:useLocalDpi xmlns:a14="http://schemas.microsoft.com/office/drawing/2010/main" xmlns=""/>
+                <a14:useLocalDpi xmlns="" xmlns:a14="http://schemas.microsoft.com/office/drawing/2010/main"/>
               </a:ext>
             </a:extLst>
           </a:blip>
@@ -3773,7 +3773,7 @@
           <a:noFill/>
           <a:extLst>
             <a:ext uri="{909E8E84-426E-40DD-AFC4-6F175D3DCCD1}">
-              <a14:hiddenFill xmlns:a14="http://schemas.microsoft.com/office/drawing/2010/main" xmlns="">
+              <a14:hiddenFill xmlns="" xmlns:a14="http://schemas.microsoft.com/office/drawing/2010/main">
                 <a:solidFill>
                   <a:srgbClr val="FFFFFF"/>
                 </a:solidFill>
@@ -4273,7 +4273,7 @@
           <a:blip r:embed="rId2" cstate="email">
             <a:extLst>
               <a:ext uri="{28A0092B-C50C-407E-A947-70E740481C1C}">
-                <a14:useLocalDpi xmlns:a14="http://schemas.microsoft.com/office/drawing/2010/main" xmlns=""/>
+                <a14:useLocalDpi xmlns="" xmlns:a14="http://schemas.microsoft.com/office/drawing/2010/main"/>
               </a:ext>
             </a:extLst>
           </a:blip>
@@ -4292,14 +4292,14 @@
           </a:ln>
           <a:extLst>
             <a:ext uri="{909E8E84-426E-40DD-AFC4-6F175D3DCCD1}">
-              <a14:hiddenFill xmlns:a14="http://schemas.microsoft.com/office/drawing/2010/main" xmlns="">
+              <a14:hiddenFill xmlns="" xmlns:a14="http://schemas.microsoft.com/office/drawing/2010/main">
                 <a:solidFill>
                   <a:srgbClr val="FFFFFF"/>
                 </a:solidFill>
               </a14:hiddenFill>
             </a:ext>
             <a:ext uri="{91240B29-F687-4F45-9708-019B960494DF}">
-              <a14:hiddenLine xmlns:a14="http://schemas.microsoft.com/office/drawing/2010/main" xmlns="" w="9525">
+              <a14:hiddenLine xmlns="" xmlns:a14="http://schemas.microsoft.com/office/drawing/2010/main" w="9525">
                 <a:solidFill>
                   <a:srgbClr val="000000"/>
                 </a:solidFill>
@@ -4325,7 +4325,7 @@
           <a:blip r:embed="rId3" cstate="email">
             <a:extLst>
               <a:ext uri="{28A0092B-C50C-407E-A947-70E740481C1C}">
-                <a14:useLocalDpi xmlns:a14="http://schemas.microsoft.com/office/drawing/2010/main" xmlns=""/>
+                <a14:useLocalDpi xmlns="" xmlns:a14="http://schemas.microsoft.com/office/drawing/2010/main"/>
               </a:ext>
             </a:extLst>
           </a:blip>
@@ -4339,7 +4339,7 @@
           <a:noFill/>
           <a:extLst>
             <a:ext uri="{909E8E84-426E-40DD-AFC4-6F175D3DCCD1}">
-              <a14:hiddenFill xmlns:a14="http://schemas.microsoft.com/office/drawing/2010/main" xmlns="">
+              <a14:hiddenFill xmlns="" xmlns:a14="http://schemas.microsoft.com/office/drawing/2010/main">
                 <a:solidFill>
                   <a:srgbClr val="FFFFFF"/>
                 </a:solidFill>
@@ -4362,7 +4362,7 @@
           <a:blip r:embed="rId4" cstate="email">
             <a:extLst>
               <a:ext uri="{28A0092B-C50C-407E-A947-70E740481C1C}">
-                <a14:useLocalDpi xmlns:a14="http://schemas.microsoft.com/office/drawing/2010/main" xmlns=""/>
+                <a14:useLocalDpi xmlns="" xmlns:a14="http://schemas.microsoft.com/office/drawing/2010/main"/>
               </a:ext>
             </a:extLst>
           </a:blip>
@@ -4376,7 +4376,7 @@
           <a:noFill/>
           <a:extLst>
             <a:ext uri="{909E8E84-426E-40DD-AFC4-6F175D3DCCD1}">
-              <a14:hiddenFill xmlns:a14="http://schemas.microsoft.com/office/drawing/2010/main" xmlns="">
+              <a14:hiddenFill xmlns="" xmlns:a14="http://schemas.microsoft.com/office/drawing/2010/main">
                 <a:solidFill>
                   <a:srgbClr val="FFFFFF"/>
                 </a:solidFill>
@@ -4399,7 +4399,7 @@
           <a:blip r:embed="rId5" cstate="email">
             <a:extLst>
               <a:ext uri="{28A0092B-C50C-407E-A947-70E740481C1C}">
-                <a14:useLocalDpi xmlns:a14="http://schemas.microsoft.com/office/drawing/2010/main" xmlns=""/>
+                <a14:useLocalDpi xmlns="" xmlns:a14="http://schemas.microsoft.com/office/drawing/2010/main"/>
               </a:ext>
             </a:extLst>
           </a:blip>
@@ -4416,7 +4416,7 @@
           </a:ln>
           <a:extLst>
             <a:ext uri="{909E8E84-426E-40DD-AFC4-6F175D3DCCD1}">
-              <a14:hiddenFill xmlns:a14="http://schemas.microsoft.com/office/drawing/2010/main" xmlns="">
+              <a14:hiddenFill xmlns="" xmlns:a14="http://schemas.microsoft.com/office/drawing/2010/main">
                 <a:solidFill>
                   <a:srgbClr val="FFFFFF"/>
                 </a:solidFill>
@@ -4439,7 +4439,7 @@
           <a:blip r:embed="rId6" cstate="email">
             <a:extLst>
               <a:ext uri="{28A0092B-C50C-407E-A947-70E740481C1C}">
-                <a14:useLocalDpi xmlns:a14="http://schemas.microsoft.com/office/drawing/2010/main" xmlns=""/>
+                <a14:useLocalDpi xmlns="" xmlns:a14="http://schemas.microsoft.com/office/drawing/2010/main"/>
               </a:ext>
             </a:extLst>
           </a:blip>
@@ -4453,7 +4453,7 @@
           <a:noFill/>
           <a:extLst>
             <a:ext uri="{909E8E84-426E-40DD-AFC4-6F175D3DCCD1}">
-              <a14:hiddenFill xmlns:a14="http://schemas.microsoft.com/office/drawing/2010/main" xmlns="">
+              <a14:hiddenFill xmlns="" xmlns:a14="http://schemas.microsoft.com/office/drawing/2010/main">
                 <a:solidFill>
                   <a:srgbClr val="FFFFFF"/>
                 </a:solidFill>
@@ -4476,7 +4476,7 @@
           <a:blip r:embed="rId7" cstate="email">
             <a:extLst>
               <a:ext uri="{28A0092B-C50C-407E-A947-70E740481C1C}">
-                <a14:useLocalDpi xmlns:a14="http://schemas.microsoft.com/office/drawing/2010/main" xmlns=""/>
+                <a14:useLocalDpi xmlns="" xmlns:a14="http://schemas.microsoft.com/office/drawing/2010/main"/>
               </a:ext>
             </a:extLst>
           </a:blip>
@@ -4506,14 +4506,14 @@
           <a:noFill/>
           <a:extLst>
             <a:ext uri="{909E8E84-426E-40DD-AFC4-6F175D3DCCD1}">
-              <a14:hiddenFill xmlns:a14="http://schemas.microsoft.com/office/drawing/2010/main" xmlns="">
+              <a14:hiddenFill xmlns="" xmlns:a14="http://schemas.microsoft.com/office/drawing/2010/main">
                 <a:solidFill>
                   <a:schemeClr val="accent1"/>
                 </a:solidFill>
               </a14:hiddenFill>
             </a:ext>
             <a:ext uri="{91240B29-F687-4F45-9708-019B960494DF}">
-              <a14:hiddenLine xmlns:a14="http://schemas.microsoft.com/office/drawing/2010/main" xmlns="" w="9525">
+              <a14:hiddenLine xmlns="" xmlns:a14="http://schemas.microsoft.com/office/drawing/2010/main" w="9525">
                 <a:solidFill>
                   <a:schemeClr val="tx1"/>
                 </a:solidFill>
@@ -4523,7 +4523,7 @@
               </a14:hiddenLine>
             </a:ext>
             <a:ext uri="{AF507438-7753-43E0-B8FC-AC1667EBCBE1}">
-              <a14:hiddenEffects xmlns:a14="http://schemas.microsoft.com/office/drawing/2010/main" xmlns="">
+              <a14:hiddenEffects xmlns="" xmlns:a14="http://schemas.microsoft.com/office/drawing/2010/main">
                 <a:effectLst>
                   <a:outerShdw dist="35921" dir="2700000" algn="ctr" rotWithShape="0">
                     <a:schemeClr val="bg2"/>
@@ -4712,7 +4712,7 @@
     </p:spTree>
     <p:extLst>
       <p:ext uri="{BB962C8B-B14F-4D97-AF65-F5344CB8AC3E}">
-        <p14:creationId xmlns:p14="http://schemas.microsoft.com/office/powerpoint/2010/main" xmlns="" val="377435107"/>
+        <p14:creationId xmlns="" xmlns:p14="http://schemas.microsoft.com/office/powerpoint/2010/main" val="377435107"/>
       </p:ext>
     </p:extLst>
   </p:cSld>
@@ -4720,7 +4720,7 @@
     <a:masterClrMapping/>
   </p:clrMapOvr>
   <mc:AlternateContent xmlns:mc="http://schemas.openxmlformats.org/markup-compatibility/2006">
-    <mc:Choice xmlns:p14="http://schemas.microsoft.com/office/powerpoint/2010/main" xmlns="" Requires="p14">
+    <mc:Choice xmlns="" xmlns:p14="http://schemas.microsoft.com/office/powerpoint/2010/main" Requires="p14">
       <p:transition spd="slow" p14:dur="2000"/>
     </mc:Choice>
     <mc:Fallback>
@@ -4773,8 +4773,12 @@
               <a:defRPr/>
             </a:pPr>
             <a:r>
-              <a:rPr lang="de-DE" smtClean="0"/>
-              <a:t>Titel der Präsentation – Name Vortragende/-r – Datum</a:t>
+              <a:rPr lang="de-DE" dirty="0" err="1" smtClean="0"/>
+              <a:t>LoRaWAN</a:t>
+            </a:r>
+            <a:r>
+              <a:rPr lang="de-DE" dirty="0" smtClean="0"/>
+              <a:t> Projekt – Modul Projektmanagement – Auftraggeber Technologiestiftung Berlin</a:t>
             </a:r>
             <a:endParaRPr lang="de-DE" dirty="0">
               <a:solidFill>
@@ -4902,7 +4906,7 @@
           <a:blip r:embed="rId2" cstate="print">
             <a:extLst>
               <a:ext uri="{28A0092B-C50C-407E-A947-70E740481C1C}">
-                <a14:useLocalDpi xmlns:a14="http://schemas.microsoft.com/office/drawing/2010/main" xmlns="" val="0"/>
+                <a14:useLocalDpi xmlns="" xmlns:a14="http://schemas.microsoft.com/office/drawing/2010/main" val="0"/>
               </a:ext>
             </a:extLst>
           </a:blip>
@@ -4932,7 +4936,7 @@
           <a:blip r:embed="rId3" cstate="print">
             <a:extLst>
               <a:ext uri="{28A0092B-C50C-407E-A947-70E740481C1C}">
-                <a14:useLocalDpi xmlns:a14="http://schemas.microsoft.com/office/drawing/2010/main" xmlns="" val="0"/>
+                <a14:useLocalDpi xmlns="" xmlns:a14="http://schemas.microsoft.com/office/drawing/2010/main" val="0"/>
               </a:ext>
             </a:extLst>
           </a:blip>
@@ -4962,7 +4966,7 @@
           <a:blip r:embed="rId4" cstate="print">
             <a:extLst>
               <a:ext uri="{28A0092B-C50C-407E-A947-70E740481C1C}">
-                <a14:useLocalDpi xmlns:a14="http://schemas.microsoft.com/office/drawing/2010/main" xmlns="" val="0"/>
+                <a14:useLocalDpi xmlns="" xmlns:a14="http://schemas.microsoft.com/office/drawing/2010/main" val="0"/>
               </a:ext>
             </a:extLst>
           </a:blip>
@@ -4992,7 +4996,7 @@
           <a:blip r:embed="rId5" cstate="print">
             <a:extLst>
               <a:ext uri="{28A0092B-C50C-407E-A947-70E740481C1C}">
-                <a14:useLocalDpi xmlns:a14="http://schemas.microsoft.com/office/drawing/2010/main" xmlns="" val="0"/>
+                <a14:useLocalDpi xmlns="" xmlns:a14="http://schemas.microsoft.com/office/drawing/2010/main" val="0"/>
               </a:ext>
             </a:extLst>
           </a:blip>
@@ -5022,7 +5026,7 @@
           <a:blip r:embed="rId6" cstate="print">
             <a:extLst>
               <a:ext uri="{28A0092B-C50C-407E-A947-70E740481C1C}">
-                <a14:useLocalDpi xmlns:a14="http://schemas.microsoft.com/office/drawing/2010/main" xmlns="" val="0"/>
+                <a14:useLocalDpi xmlns="" xmlns:a14="http://schemas.microsoft.com/office/drawing/2010/main" val="0"/>
               </a:ext>
             </a:extLst>
           </a:blip>
@@ -5328,8 +5332,12 @@
               <a:defRPr/>
             </a:pPr>
             <a:r>
-              <a:rPr lang="de-DE" smtClean="0"/>
-              <a:t>Titel der Präsentation – Name Vortragende/-r – Datum</a:t>
+              <a:rPr lang="de-DE" dirty="0" err="1" smtClean="0"/>
+              <a:t>LoRaWAN</a:t>
+            </a:r>
+            <a:r>
+              <a:rPr lang="de-DE" dirty="0" smtClean="0"/>
+              <a:t> Projekt – Modul Projektmanagement – Auftraggeber Technologiestiftung Berlin</a:t>
             </a:r>
             <a:endParaRPr lang="de-DE" dirty="0">
               <a:solidFill>
@@ -5615,8 +5623,12 @@
               <a:defRPr/>
             </a:pPr>
             <a:r>
-              <a:rPr lang="de-DE" smtClean="0"/>
-              <a:t>Titel der Präsentation – Name Vortragende/-r – Datum</a:t>
+              <a:rPr lang="de-DE" dirty="0" err="1" smtClean="0"/>
+              <a:t>LoRaWAN</a:t>
+            </a:r>
+            <a:r>
+              <a:rPr lang="de-DE" dirty="0" smtClean="0"/>
+              <a:t> Projekt – Modul Projektmanagement – Auftraggeber Technologiestiftung Berlin</a:t>
             </a:r>
             <a:endParaRPr lang="de-DE" dirty="0">
               <a:solidFill>
@@ -5936,8 +5948,12 @@
               <a:defRPr/>
             </a:pPr>
             <a:r>
-              <a:rPr lang="de-DE" smtClean="0"/>
-              <a:t>Titel der Präsentation – Name Vortragende/-r – Datum</a:t>
+              <a:rPr lang="de-DE" dirty="0" err="1" smtClean="0"/>
+              <a:t>LoRaWAN</a:t>
+            </a:r>
+            <a:r>
+              <a:rPr lang="de-DE" dirty="0" smtClean="0"/>
+              <a:t> Projekt – Modul Projektmanagement – Auftraggeber Technologiestiftung Berlin</a:t>
             </a:r>
             <a:endParaRPr lang="de-DE" dirty="0">
               <a:solidFill>
@@ -6229,8 +6245,12 @@
               <a:defRPr/>
             </a:pPr>
             <a:r>
-              <a:rPr lang="de-DE" smtClean="0"/>
-              <a:t>Titel der Präsentation – Name Vortragende/-r – Datum</a:t>
+              <a:rPr lang="de-DE" dirty="0" err="1" smtClean="0"/>
+              <a:t>LoRaWAN</a:t>
+            </a:r>
+            <a:r>
+              <a:rPr lang="de-DE" dirty="0" smtClean="0"/>
+              <a:t> Projekt – Modul Projektmanagement – Auftraggeber Technologiestiftung Berlin</a:t>
             </a:r>
             <a:endParaRPr lang="de-DE" dirty="0">
               <a:solidFill>
@@ -6363,8 +6383,12 @@
               <a:defRPr/>
             </a:pPr>
             <a:r>
-              <a:rPr lang="de-DE" smtClean="0"/>
-              <a:t>Titel der Präsentation – Name Vortragende/-r – Datum</a:t>
+              <a:rPr lang="de-DE" dirty="0" err="1" smtClean="0"/>
+              <a:t>LoRaWAN</a:t>
+            </a:r>
+            <a:r>
+              <a:rPr lang="de-DE" dirty="0" smtClean="0"/>
+              <a:t> Projekt – Modul Projektmanagement – Auftraggeber Technologiestiftung Berlin</a:t>
             </a:r>
             <a:endParaRPr lang="de-DE" dirty="0">
               <a:solidFill>

</xml_diff>

<commit_message>
added text below data flow images
</commit_message>
<xml_diff>
--- a/doc/Praesentation_Meeting_13.06.2017.pptx
+++ b/doc/Praesentation_Meeting_13.06.2017.pptx
@@ -3492,7 +3492,7 @@
                 </a:uFill>
                 <a:latin typeface="Arial"/>
               </a:rPr>
-              <a:t>T</a:t>
+              <a:t>Titel der </a:t>
             </a:r>
             <a:r>
               <a:rPr b="1" lang="de-DE" sz="3600" spc="-1" strike="noStrike">
@@ -3506,245 +3506,7 @@
                 </a:uFill>
                 <a:latin typeface="Arial"/>
               </a:rPr>
-              <a:t>it</a:t>
-            </a:r>
-            <a:r>
-              <a:rPr b="1" lang="de-DE" sz="3600" spc="-1" strike="noStrike">
-                <a:solidFill>
-                  <a:srgbClr val="ffffff"/>
-                </a:solidFill>
-                <a:uFill>
-                  <a:solidFill>
-                    <a:srgbClr val="ffffff"/>
-                  </a:solidFill>
-                </a:uFill>
-                <a:latin typeface="Arial"/>
-              </a:rPr>
-              <a:t>e</a:t>
-            </a:r>
-            <a:r>
-              <a:rPr b="1" lang="de-DE" sz="3600" spc="-1" strike="noStrike">
-                <a:solidFill>
-                  <a:srgbClr val="ffffff"/>
-                </a:solidFill>
-                <a:uFill>
-                  <a:solidFill>
-                    <a:srgbClr val="ffffff"/>
-                  </a:solidFill>
-                </a:uFill>
-                <a:latin typeface="Arial"/>
-              </a:rPr>
-              <a:t>l </a:t>
-            </a:r>
-            <a:r>
-              <a:rPr b="1" lang="de-DE" sz="3600" spc="-1" strike="noStrike">
-                <a:solidFill>
-                  <a:srgbClr val="ffffff"/>
-                </a:solidFill>
-                <a:uFill>
-                  <a:solidFill>
-                    <a:srgbClr val="ffffff"/>
-                  </a:solidFill>
-                </a:uFill>
-                <a:latin typeface="Arial"/>
-              </a:rPr>
-              <a:t>d</a:t>
-            </a:r>
-            <a:r>
-              <a:rPr b="1" lang="de-DE" sz="3600" spc="-1" strike="noStrike">
-                <a:solidFill>
-                  <a:srgbClr val="ffffff"/>
-                </a:solidFill>
-                <a:uFill>
-                  <a:solidFill>
-                    <a:srgbClr val="ffffff"/>
-                  </a:solidFill>
-                </a:uFill>
-                <a:latin typeface="Arial"/>
-              </a:rPr>
-              <a:t>e</a:t>
-            </a:r>
-            <a:r>
-              <a:rPr b="1" lang="de-DE" sz="3600" spc="-1" strike="noStrike">
-                <a:solidFill>
-                  <a:srgbClr val="ffffff"/>
-                </a:solidFill>
-                <a:uFill>
-                  <a:solidFill>
-                    <a:srgbClr val="ffffff"/>
-                  </a:solidFill>
-                </a:uFill>
-                <a:latin typeface="Arial"/>
-              </a:rPr>
-              <a:t>r </a:t>
-            </a:r>
-            <a:r>
-              <a:rPr b="1" lang="de-DE" sz="3600" spc="-1" strike="noStrike">
-                <a:solidFill>
-                  <a:srgbClr val="ffffff"/>
-                </a:solidFill>
-                <a:uFill>
-                  <a:solidFill>
-                    <a:srgbClr val="ffffff"/>
-                  </a:solidFill>
-                </a:uFill>
-                <a:latin typeface="Arial"/>
-              </a:rPr>
-              <a:t>V</a:t>
-            </a:r>
-            <a:r>
-              <a:rPr b="1" lang="de-DE" sz="3600" spc="-1" strike="noStrike">
-                <a:solidFill>
-                  <a:srgbClr val="ffffff"/>
-                </a:solidFill>
-                <a:uFill>
-                  <a:solidFill>
-                    <a:srgbClr val="ffffff"/>
-                  </a:solidFill>
-                </a:uFill>
-                <a:latin typeface="Arial"/>
-              </a:rPr>
-              <a:t>e</a:t>
-            </a:r>
-            <a:r>
-              <a:rPr b="1" lang="de-DE" sz="3600" spc="-1" strike="noStrike">
-                <a:solidFill>
-                  <a:srgbClr val="ffffff"/>
-                </a:solidFill>
-                <a:uFill>
-                  <a:solidFill>
-                    <a:srgbClr val="ffffff"/>
-                  </a:solidFill>
-                </a:uFill>
-                <a:latin typeface="Arial"/>
-              </a:rPr>
-              <a:t>r</a:t>
-            </a:r>
-            <a:r>
-              <a:rPr b="1" lang="de-DE" sz="3600" spc="-1" strike="noStrike">
-                <a:solidFill>
-                  <a:srgbClr val="ffffff"/>
-                </a:solidFill>
-                <a:uFill>
-                  <a:solidFill>
-                    <a:srgbClr val="ffffff"/>
-                  </a:solidFill>
-                </a:uFill>
-                <a:latin typeface="Arial"/>
-              </a:rPr>
-              <a:t>a</a:t>
-            </a:r>
-            <a:r>
-              <a:rPr b="1" lang="de-DE" sz="3600" spc="-1" strike="noStrike">
-                <a:solidFill>
-                  <a:srgbClr val="ffffff"/>
-                </a:solidFill>
-                <a:uFill>
-                  <a:solidFill>
-                    <a:srgbClr val="ffffff"/>
-                  </a:solidFill>
-                </a:uFill>
-                <a:latin typeface="Arial"/>
-              </a:rPr>
-              <a:t>n</a:t>
-            </a:r>
-            <a:r>
-              <a:rPr b="1" lang="de-DE" sz="3600" spc="-1" strike="noStrike">
-                <a:solidFill>
-                  <a:srgbClr val="ffffff"/>
-                </a:solidFill>
-                <a:uFill>
-                  <a:solidFill>
-                    <a:srgbClr val="ffffff"/>
-                  </a:solidFill>
-                </a:uFill>
-                <a:latin typeface="Arial"/>
-              </a:rPr>
-              <a:t>s</a:t>
-            </a:r>
-            <a:r>
-              <a:rPr b="1" lang="de-DE" sz="3600" spc="-1" strike="noStrike">
-                <a:solidFill>
-                  <a:srgbClr val="ffffff"/>
-                </a:solidFill>
-                <a:uFill>
-                  <a:solidFill>
-                    <a:srgbClr val="ffffff"/>
-                  </a:solidFill>
-                </a:uFill>
-                <a:latin typeface="Arial"/>
-              </a:rPr>
-              <a:t>t</a:t>
-            </a:r>
-            <a:r>
-              <a:rPr b="1" lang="de-DE" sz="3600" spc="-1" strike="noStrike">
-                <a:solidFill>
-                  <a:srgbClr val="ffffff"/>
-                </a:solidFill>
-                <a:uFill>
-                  <a:solidFill>
-                    <a:srgbClr val="ffffff"/>
-                  </a:solidFill>
-                </a:uFill>
-                <a:latin typeface="Arial"/>
-              </a:rPr>
-              <a:t>al</a:t>
-            </a:r>
-            <a:r>
-              <a:rPr b="1" lang="de-DE" sz="3600" spc="-1" strike="noStrike">
-                <a:solidFill>
-                  <a:srgbClr val="ffffff"/>
-                </a:solidFill>
-                <a:uFill>
-                  <a:solidFill>
-                    <a:srgbClr val="ffffff"/>
-                  </a:solidFill>
-                </a:uFill>
-                <a:latin typeface="Arial"/>
-              </a:rPr>
-              <a:t>t</a:t>
-            </a:r>
-            <a:r>
-              <a:rPr b="1" lang="de-DE" sz="3600" spc="-1" strike="noStrike">
-                <a:solidFill>
-                  <a:srgbClr val="ffffff"/>
-                </a:solidFill>
-                <a:uFill>
-                  <a:solidFill>
-                    <a:srgbClr val="ffffff"/>
-                  </a:solidFill>
-                </a:uFill>
-                <a:latin typeface="Arial"/>
-              </a:rPr>
-              <a:t>u</a:t>
-            </a:r>
-            <a:r>
-              <a:rPr b="1" lang="de-DE" sz="3600" spc="-1" strike="noStrike">
-                <a:solidFill>
-                  <a:srgbClr val="ffffff"/>
-                </a:solidFill>
-                <a:uFill>
-                  <a:solidFill>
-                    <a:srgbClr val="ffffff"/>
-                  </a:solidFill>
-                </a:uFill>
-                <a:latin typeface="Arial"/>
-              </a:rPr>
-              <a:t>n</a:t>
-            </a:r>
-            <a:r>
-              <a:rPr b="1" lang="de-DE" sz="3600" spc="-1" strike="noStrike">
-                <a:solidFill>
-                  <a:srgbClr val="ffffff"/>
-                </a:solidFill>
-                <a:uFill>
-                  <a:solidFill>
-                    <a:srgbClr val="ffffff"/>
-                  </a:solidFill>
-                </a:uFill>
-                <a:latin typeface="Arial"/>
-              </a:rPr>
-              <a:t>g</a:t>
+              <a:t>Veranstaltung</a:t>
             </a:r>
             <a:endParaRPr b="0" lang="de-DE" sz="3600" spc="-1" strike="noStrike">
               <a:solidFill>
@@ -4439,53 +4201,12 @@
                 </a:uFill>
                 <a:latin typeface="Arial Narrow"/>
               </a:rPr>
-              <a:t>Titel der Präsentation – Name Vortragende/-r – Datum</a:t>
+              <a:t>Titel der </a:t>
             </a:r>
-            <a:endParaRPr b="0" lang="en-US" sz="1050" spc="-1" strike="noStrike">
-              <a:solidFill>
-                <a:srgbClr val="000000"/>
-              </a:solidFill>
-              <a:uFill>
-                <a:solidFill>
-                  <a:srgbClr val="ffffff"/>
-                </a:solidFill>
-              </a:uFill>
-              <a:latin typeface="DejaVu Serif"/>
-            </a:endParaRPr>
-          </a:p>
-        </p:txBody>
-      </p:sp>
-      <p:sp>
-        <p:nvSpPr>
-          <p:cNvPr id="59" name="PlaceHolder 6"/>
-          <p:cNvSpPr>
-            <a:spLocks noGrp="1"/>
-          </p:cNvSpPr>
-          <p:nvPr>
-            <p:ph type="sldNum"/>
-          </p:nvPr>
-        </p:nvSpPr>
-        <p:spPr>
-          <a:xfrm>
-            <a:off x="6530040" y="6540840"/>
-            <a:ext cx="2133360" cy="239400"/>
-          </a:xfrm>
-          <a:prstGeom prst="rect">
-            <a:avLst/>
-          </a:prstGeom>
-        </p:spPr>
-        <p:txBody>
-          <a:bodyPr rIns="0" tIns="0"/>
-          <a:p>
-            <a:pPr algn="r">
-              <a:lnSpc>
-                <a:spcPct val="100000"/>
-              </a:lnSpc>
-            </a:pPr>
-            <a:fld id="{0EA4E663-D486-4F6C-82F6-577C11C9BD57}" type="slidenum">
-              <a:rPr b="1" lang="en-US" sz="1300" spc="-1" strike="noStrike">
-                <a:solidFill>
-                  <a:srgbClr val="ffffff"/>
+            <a:r>
+              <a:rPr b="0" lang="en-US" sz="1050" spc="-1" strike="noStrike">
+                <a:solidFill>
+                  <a:srgbClr val="0098a1"/>
                 </a:solidFill>
                 <a:uFill>
                   <a:solidFill>
@@ -4494,7 +4215,104 @@
                 </a:uFill>
                 <a:latin typeface="Arial Narrow"/>
               </a:rPr>
-              <a:t>&lt;number&gt;</a:t>
+              <a:t>Präsentation – </a:t>
+            </a:r>
+            <a:r>
+              <a:rPr b="0" lang="en-US" sz="1050" spc="-1" strike="noStrike">
+                <a:solidFill>
+                  <a:srgbClr val="0098a1"/>
+                </a:solidFill>
+                <a:uFill>
+                  <a:solidFill>
+                    <a:srgbClr val="ffffff"/>
+                  </a:solidFill>
+                </a:uFill>
+                <a:latin typeface="Arial Narrow"/>
+              </a:rPr>
+              <a:t>Name </a:t>
+            </a:r>
+            <a:r>
+              <a:rPr b="0" lang="en-US" sz="1050" spc="-1" strike="noStrike">
+                <a:solidFill>
+                  <a:srgbClr val="0098a1"/>
+                </a:solidFill>
+                <a:uFill>
+                  <a:solidFill>
+                    <a:srgbClr val="ffffff"/>
+                  </a:solidFill>
+                </a:uFill>
+                <a:latin typeface="Arial Narrow"/>
+              </a:rPr>
+              <a:t>Vortragende/-r </a:t>
+            </a:r>
+            <a:r>
+              <a:rPr b="0" lang="en-US" sz="1050" spc="-1" strike="noStrike">
+                <a:solidFill>
+                  <a:srgbClr val="0098a1"/>
+                </a:solidFill>
+                <a:uFill>
+                  <a:solidFill>
+                    <a:srgbClr val="ffffff"/>
+                  </a:solidFill>
+                </a:uFill>
+                <a:latin typeface="Arial Narrow"/>
+              </a:rPr>
+              <a:t>– Datum</a:t>
+            </a:r>
+            <a:endParaRPr b="0" lang="en-US" sz="1050" spc="-1" strike="noStrike">
+              <a:solidFill>
+                <a:srgbClr val="000000"/>
+              </a:solidFill>
+              <a:uFill>
+                <a:solidFill>
+                  <a:srgbClr val="ffffff"/>
+                </a:solidFill>
+              </a:uFill>
+              <a:latin typeface="DejaVu Serif"/>
+            </a:endParaRPr>
+          </a:p>
+        </p:txBody>
+      </p:sp>
+      <p:sp>
+        <p:nvSpPr>
+          <p:cNvPr id="59" name="PlaceHolder 6"/>
+          <p:cNvSpPr>
+            <a:spLocks noGrp="1"/>
+          </p:cNvSpPr>
+          <p:nvPr>
+            <p:ph type="sldNum"/>
+          </p:nvPr>
+        </p:nvSpPr>
+        <p:spPr>
+          <a:xfrm>
+            <a:off x="6530040" y="6540840"/>
+            <a:ext cx="2133360" cy="239400"/>
+          </a:xfrm>
+          <a:prstGeom prst="rect">
+            <a:avLst/>
+          </a:prstGeom>
+        </p:spPr>
+        <p:txBody>
+          <a:bodyPr rIns="0" tIns="0"/>
+          <a:p>
+            <a:pPr algn="r">
+              <a:lnSpc>
+                <a:spcPct val="100000"/>
+              </a:lnSpc>
+            </a:pPr>
+            <a:fld id="{B6C4A5C4-174F-4527-9737-42AEE95BDC62}" type="slidenum">
+              <a:rPr b="1" lang="en-US" sz="1300" spc="-1" strike="noStrike">
+                <a:solidFill>
+                  <a:srgbClr val="ffffff"/>
+                </a:solidFill>
+                <a:uFill>
+                  <a:solidFill>
+                    <a:srgbClr val="ffffff"/>
+                  </a:solidFill>
+                </a:uFill>
+                <a:latin typeface="Arial Narrow"/>
+              </a:rPr>
+              <a:t>1</a:t>
             </a:fld>
             <a:endParaRPr b="0" lang="en-US" sz="1300" spc="-1" strike="noStrike">
               <a:solidFill>
@@ -4703,7 +4521,63 @@
                 </a:uFill>
                 <a:latin typeface="Arial"/>
               </a:rPr>
-              <a:t>Click to edit the title text format</a:t>
+              <a:t>Click to </a:t>
+            </a:r>
+            <a:r>
+              <a:rPr b="0" lang="de-DE" sz="2200" spc="-1" strike="noStrike">
+                <a:solidFill>
+                  <a:srgbClr val="000000"/>
+                </a:solidFill>
+                <a:uFill>
+                  <a:solidFill>
+                    <a:srgbClr val="ffffff"/>
+                  </a:solidFill>
+                </a:uFill>
+                <a:latin typeface="Arial"/>
+              </a:rPr>
+              <a:t>edit the </a:t>
+            </a:r>
+            <a:r>
+              <a:rPr b="0" lang="de-DE" sz="2200" spc="-1" strike="noStrike">
+                <a:solidFill>
+                  <a:srgbClr val="000000"/>
+                </a:solidFill>
+                <a:uFill>
+                  <a:solidFill>
+                    <a:srgbClr val="ffffff"/>
+                  </a:solidFill>
+                </a:uFill>
+                <a:latin typeface="Arial"/>
+              </a:rPr>
+              <a:t>title </a:t>
+            </a:r>
+            <a:r>
+              <a:rPr b="0" lang="de-DE" sz="2200" spc="-1" strike="noStrike">
+                <a:solidFill>
+                  <a:srgbClr val="000000"/>
+                </a:solidFill>
+                <a:uFill>
+                  <a:solidFill>
+                    <a:srgbClr val="ffffff"/>
+                  </a:solidFill>
+                </a:uFill>
+                <a:latin typeface="Arial"/>
+              </a:rPr>
+              <a:t>text </a:t>
+            </a:r>
+            <a:r>
+              <a:rPr b="0" lang="de-DE" sz="2200" spc="-1" strike="noStrike">
+                <a:solidFill>
+                  <a:srgbClr val="000000"/>
+                </a:solidFill>
+                <a:uFill>
+                  <a:solidFill>
+                    <a:srgbClr val="ffffff"/>
+                  </a:solidFill>
+                </a:uFill>
+                <a:latin typeface="Arial"/>
+              </a:rPr>
+              <a:t>format</a:t>
             </a:r>
             <a:endParaRPr b="0" lang="de-DE" sz="2200" spc="-1" strike="noStrike">
               <a:solidFill>
@@ -5116,7 +4990,7 @@
                 <a:spcPct val="100000"/>
               </a:lnSpc>
             </a:pPr>
-            <a:fld id="{46CD6E72-8649-4CD7-945F-BE107F33213E}" type="slidenum">
+            <a:fld id="{CAD9E5B6-012F-43FC-8D57-82B2172C1D55}" type="slidenum">
               <a:rPr b="1" lang="en-US" sz="1300" spc="-1" strike="noStrike">
                 <a:solidFill>
                   <a:srgbClr val="ffffff"/>
@@ -5128,7 +5002,7 @@
                 </a:uFill>
                 <a:latin typeface="Arial Narrow"/>
               </a:rPr>
-              <a:t>&lt;number&gt;</a:t>
+              <a:t>1</a:t>
             </a:fld>
             <a:endParaRPr b="0" lang="en-US" sz="1300" spc="-1" strike="noStrike">
               <a:solidFill>
@@ -5505,6 +5379,247 @@
           </a:effectRef>
           <a:fontRef idx="minor"/>
         </p:style>
+      </p:sp>
+      <p:sp>
+        <p:nvSpPr>
+          <p:cNvPr id="119" name="TextShape 9"/>
+          <p:cNvSpPr txBox="1"/>
+          <p:nvPr/>
+        </p:nvSpPr>
+        <p:spPr>
+          <a:xfrm>
+            <a:off x="671040" y="4754880"/>
+            <a:ext cx="1066320" cy="311400"/>
+          </a:xfrm>
+          <a:prstGeom prst="rect">
+            <a:avLst/>
+          </a:prstGeom>
+          <a:noFill/>
+          <a:ln>
+            <a:noFill/>
+          </a:ln>
+        </p:spPr>
+        <p:txBody>
+          <a:bodyPr lIns="90000" rIns="90000" tIns="45000" bIns="45000"/>
+          <a:p>
+            <a:r>
+              <a:rPr b="0" lang="en-US" sz="1500" spc="-1" strike="noStrike">
+                <a:solidFill>
+                  <a:srgbClr val="000000"/>
+                </a:solidFill>
+                <a:uFill>
+                  <a:solidFill>
+                    <a:srgbClr val="ffffff"/>
+                  </a:solidFill>
+                </a:uFill>
+                <a:latin typeface="DejaVu Sans"/>
+              </a:rPr>
+              <a:t>Sensoren</a:t>
+            </a:r>
+            <a:endParaRPr b="0" lang="en-US" sz="1500" spc="-1" strike="noStrike">
+              <a:solidFill>
+                <a:srgbClr val="000000"/>
+              </a:solidFill>
+              <a:uFill>
+                <a:solidFill>
+                  <a:srgbClr val="ffffff"/>
+                </a:solidFill>
+              </a:uFill>
+              <a:latin typeface="DejaVu Sans"/>
+            </a:endParaRPr>
+          </a:p>
+        </p:txBody>
+      </p:sp>
+      <p:sp>
+        <p:nvSpPr>
+          <p:cNvPr id="120" name="TextShape 10"/>
+          <p:cNvSpPr txBox="1"/>
+          <p:nvPr/>
+        </p:nvSpPr>
+        <p:spPr>
+          <a:xfrm>
+            <a:off x="2248560" y="4754880"/>
+            <a:ext cx="1957680" cy="311400"/>
+          </a:xfrm>
+          <a:prstGeom prst="rect">
+            <a:avLst/>
+          </a:prstGeom>
+          <a:noFill/>
+          <a:ln>
+            <a:noFill/>
+          </a:ln>
+        </p:spPr>
+        <p:txBody>
+          <a:bodyPr lIns="90000" rIns="90000" tIns="45000" bIns="45000"/>
+          <a:p>
+            <a:r>
+              <a:rPr b="0" lang="en-US" sz="1500" spc="-1" strike="noStrike">
+                <a:solidFill>
+                  <a:srgbClr val="000000"/>
+                </a:solidFill>
+                <a:uFill>
+                  <a:solidFill>
+                    <a:srgbClr val="ffffff"/>
+                  </a:solidFill>
+                </a:uFill>
+                <a:latin typeface="DejaVu Sans"/>
+              </a:rPr>
+              <a:t>TheThingsNetwork</a:t>
+            </a:r>
+            <a:endParaRPr b="0" lang="en-US" sz="1500" spc="-1" strike="noStrike">
+              <a:solidFill>
+                <a:srgbClr val="000000"/>
+              </a:solidFill>
+              <a:uFill>
+                <a:solidFill>
+                  <a:srgbClr val="ffffff"/>
+                </a:solidFill>
+              </a:uFill>
+              <a:latin typeface="DejaVu Sans"/>
+            </a:endParaRPr>
+          </a:p>
+        </p:txBody>
+      </p:sp>
+      <p:sp>
+        <p:nvSpPr>
+          <p:cNvPr id="121" name="TextShape 11"/>
+          <p:cNvSpPr txBox="1"/>
+          <p:nvPr/>
+        </p:nvSpPr>
+        <p:spPr>
+          <a:xfrm>
+            <a:off x="4552560" y="4754880"/>
+            <a:ext cx="1293120" cy="532440"/>
+          </a:xfrm>
+          <a:prstGeom prst="rect">
+            <a:avLst/>
+          </a:prstGeom>
+          <a:noFill/>
+          <a:ln>
+            <a:noFill/>
+          </a:ln>
+        </p:spPr>
+        <p:txBody>
+          <a:bodyPr lIns="90000" rIns="90000" tIns="45000" bIns="45000"/>
+          <a:p>
+            <a:r>
+              <a:rPr b="0" lang="en-US" sz="1500" spc="-1" strike="noStrike">
+                <a:solidFill>
+                  <a:srgbClr val="000000"/>
+                </a:solidFill>
+                <a:uFill>
+                  <a:solidFill>
+                    <a:srgbClr val="ffffff"/>
+                  </a:solidFill>
+                </a:uFill>
+                <a:latin typeface="DejaVu Sans"/>
+              </a:rPr>
+              <a:t>Datenbank-</a:t>
+            </a:r>
+            <a:endParaRPr b="0" lang="en-US" sz="1500" spc="-1" strike="noStrike">
+              <a:solidFill>
+                <a:srgbClr val="000000"/>
+              </a:solidFill>
+              <a:uFill>
+                <a:solidFill>
+                  <a:srgbClr val="ffffff"/>
+                </a:solidFill>
+              </a:uFill>
+              <a:latin typeface="DejaVu Sans"/>
+            </a:endParaRPr>
+          </a:p>
+          <a:p>
+            <a:r>
+              <a:rPr b="0" lang="en-US" sz="1500" spc="-1" strike="noStrike">
+                <a:solidFill>
+                  <a:srgbClr val="000000"/>
+                </a:solidFill>
+                <a:uFill>
+                  <a:solidFill>
+                    <a:srgbClr val="ffffff"/>
+                  </a:solidFill>
+                </a:uFill>
+                <a:latin typeface="DejaVu Sans"/>
+              </a:rPr>
+              <a:t>    </a:t>
+            </a:r>
+            <a:r>
+              <a:rPr b="0" lang="en-US" sz="1500" spc="-1" strike="noStrike">
+                <a:solidFill>
+                  <a:srgbClr val="000000"/>
+                </a:solidFill>
+                <a:uFill>
+                  <a:solidFill>
+                    <a:srgbClr val="ffffff"/>
+                  </a:solidFill>
+                </a:uFill>
+                <a:latin typeface="DejaVu Sans"/>
+              </a:rPr>
+              <a:t>server</a:t>
+            </a:r>
+            <a:endParaRPr b="0" lang="en-US" sz="1500" spc="-1" strike="noStrike">
+              <a:solidFill>
+                <a:srgbClr val="000000"/>
+              </a:solidFill>
+              <a:uFill>
+                <a:solidFill>
+                  <a:srgbClr val="ffffff"/>
+                </a:solidFill>
+              </a:uFill>
+              <a:latin typeface="DejaVu Sans"/>
+            </a:endParaRPr>
+          </a:p>
+        </p:txBody>
+      </p:sp>
+      <p:sp>
+        <p:nvSpPr>
+          <p:cNvPr id="122" name="TextShape 12"/>
+          <p:cNvSpPr txBox="1"/>
+          <p:nvPr/>
+        </p:nvSpPr>
+        <p:spPr>
+          <a:xfrm>
+            <a:off x="6675120" y="4754880"/>
+            <a:ext cx="1512720" cy="311400"/>
+          </a:xfrm>
+          <a:prstGeom prst="rect">
+            <a:avLst/>
+          </a:prstGeom>
+          <a:noFill/>
+          <a:ln>
+            <a:noFill/>
+          </a:ln>
+        </p:spPr>
+        <p:txBody>
+          <a:bodyPr lIns="90000" rIns="90000" tIns="45000" bIns="45000"/>
+          <a:p>
+            <a:r>
+              <a:rPr b="0" lang="en-US" sz="1500" spc="-1" strike="noStrike">
+                <a:solidFill>
+                  <a:srgbClr val="000000"/>
+                </a:solidFill>
+                <a:uFill>
+                  <a:solidFill>
+                    <a:srgbClr val="ffffff"/>
+                  </a:solidFill>
+                </a:uFill>
+                <a:latin typeface="DejaVu Sans"/>
+              </a:rPr>
+              <a:t>Visualisierung</a:t>
+            </a:r>
+            <a:endParaRPr b="0" lang="en-US" sz="1500" spc="-1" strike="noStrike">
+              <a:solidFill>
+                <a:srgbClr val="000000"/>
+              </a:solidFill>
+              <a:uFill>
+                <a:solidFill>
+                  <a:srgbClr val="ffffff"/>
+                </a:solidFill>
+              </a:uFill>
+              <a:latin typeface="DejaVu Sans"/>
+            </a:endParaRPr>
+          </a:p>
+        </p:txBody>
       </p:sp>
     </p:spTree>
   </p:cSld>
@@ -5605,7 +5720,7 @@
       </p:grpSpPr>
       <p:sp>
         <p:nvSpPr>
-          <p:cNvPr id="119" name="TextShape 1"/>
+          <p:cNvPr id="123" name="TextShape 1"/>
           <p:cNvSpPr txBox="1"/>
           <p:nvPr/>
         </p:nvSpPr>
@@ -5660,7 +5775,7 @@
       </p:sp>
       <p:sp>
         <p:nvSpPr>
-          <p:cNvPr id="120" name="TextShape 2"/>
+          <p:cNvPr id="124" name="TextShape 2"/>
           <p:cNvSpPr txBox="1"/>
           <p:nvPr/>
         </p:nvSpPr>
@@ -5685,7 +5800,7 @@
                 <a:spcPct val="100000"/>
               </a:lnSpc>
             </a:pPr>
-            <a:fld id="{553F7513-F008-45FF-BE1E-3FB31885E204}" type="slidenum">
+            <a:fld id="{AE6D7CC1-F977-4C63-B022-C64E079AB3EF}" type="slidenum">
               <a:rPr b="1" lang="en-US" sz="1300" spc="-1" strike="noStrike">
                 <a:solidFill>
                   <a:srgbClr val="ffffff"/>
@@ -5715,7 +5830,7 @@
       </p:sp>
       <p:sp>
         <p:nvSpPr>
-          <p:cNvPr id="121" name="TextShape 3"/>
+          <p:cNvPr id="125" name="TextShape 3"/>
           <p:cNvSpPr txBox="1"/>
           <p:nvPr/>
         </p:nvSpPr>
@@ -5776,7 +5891,7 @@
       </p:sp>
       <p:sp>
         <p:nvSpPr>
-          <p:cNvPr id="122" name="TextShape 4"/>
+          <p:cNvPr id="126" name="TextShape 4"/>
           <p:cNvSpPr txBox="1"/>
           <p:nvPr/>
         </p:nvSpPr>
@@ -6183,7 +6298,7 @@
       </p:sp>
       <p:sp>
         <p:nvSpPr>
-          <p:cNvPr id="123" name="CustomShape 5"/>
+          <p:cNvPr id="127" name="CustomShape 5"/>
           <p:cNvSpPr/>
           <p:nvPr/>
         </p:nvSpPr>
@@ -6296,7 +6411,7 @@
       </p:grpSpPr>
       <p:sp>
         <p:nvSpPr>
-          <p:cNvPr id="124" name="TextShape 1"/>
+          <p:cNvPr id="128" name="TextShape 1"/>
           <p:cNvSpPr txBox="1"/>
           <p:nvPr/>
         </p:nvSpPr>
@@ -6351,7 +6466,7 @@
       </p:sp>
       <p:sp>
         <p:nvSpPr>
-          <p:cNvPr id="125" name="TextShape 2"/>
+          <p:cNvPr id="129" name="TextShape 2"/>
           <p:cNvSpPr txBox="1"/>
           <p:nvPr/>
         </p:nvSpPr>
@@ -6376,7 +6491,7 @@
                 <a:spcPct val="100000"/>
               </a:lnSpc>
             </a:pPr>
-            <a:fld id="{1FCF763F-AD56-46C8-9E64-F32605D8C331}" type="slidenum">
+            <a:fld id="{2DAE59E6-B24B-4452-94EA-2A8EBDBB89AE}" type="slidenum">
               <a:rPr b="1" lang="en-US" sz="1300" spc="-1" strike="noStrike">
                 <a:solidFill>
                   <a:srgbClr val="ffffff"/>
@@ -6406,7 +6521,7 @@
       </p:sp>
       <p:sp>
         <p:nvSpPr>
-          <p:cNvPr id="126" name="TextShape 3"/>
+          <p:cNvPr id="130" name="TextShape 3"/>
           <p:cNvSpPr txBox="1"/>
           <p:nvPr/>
         </p:nvSpPr>
@@ -6467,7 +6582,7 @@
       </p:sp>
       <p:sp>
         <p:nvSpPr>
-          <p:cNvPr id="127" name="TextShape 4"/>
+          <p:cNvPr id="131" name="TextShape 4"/>
           <p:cNvSpPr txBox="1"/>
           <p:nvPr/>
         </p:nvSpPr>
@@ -6763,7 +6878,7 @@
       </p:sp>
       <p:pic>
         <p:nvPicPr>
-          <p:cNvPr id="128" name="Picture 4" descr=""/>
+          <p:cNvPr id="132" name="Picture 4" descr=""/>
           <p:cNvPicPr/>
           <p:nvPr/>
         </p:nvPicPr>
@@ -6786,7 +6901,7 @@
       </p:pic>
       <p:pic>
         <p:nvPicPr>
-          <p:cNvPr id="129" name="Picture 6" descr=""/>
+          <p:cNvPr id="133" name="Picture 6" descr=""/>
           <p:cNvPicPr/>
           <p:nvPr/>
         </p:nvPicPr>
@@ -6809,7 +6924,7 @@
       </p:pic>
       <p:pic>
         <p:nvPicPr>
-          <p:cNvPr id="130" name="Picture 2" descr=""/>
+          <p:cNvPr id="134" name="Picture 2" descr=""/>
           <p:cNvPicPr/>
           <p:nvPr/>
         </p:nvPicPr>
@@ -6832,7 +6947,7 @@
       </p:pic>
       <p:pic>
         <p:nvPicPr>
-          <p:cNvPr id="131" name="Picture 8" descr=""/>
+          <p:cNvPr id="135" name="Picture 8" descr=""/>
           <p:cNvPicPr/>
           <p:nvPr/>
         </p:nvPicPr>
@@ -6855,7 +6970,7 @@
       </p:pic>
       <p:pic>
         <p:nvPicPr>
-          <p:cNvPr id="132" name="Picture 10" descr=""/>
+          <p:cNvPr id="136" name="Picture 10" descr=""/>
           <p:cNvPicPr/>
           <p:nvPr/>
         </p:nvPicPr>
@@ -6927,7 +7042,7 @@
       </p:grpSpPr>
       <p:sp>
         <p:nvSpPr>
-          <p:cNvPr id="133" name="TextShape 1"/>
+          <p:cNvPr id="137" name="TextShape 1"/>
           <p:cNvSpPr txBox="1"/>
           <p:nvPr/>
         </p:nvSpPr>
@@ -6982,7 +7097,7 @@
       </p:sp>
       <p:sp>
         <p:nvSpPr>
-          <p:cNvPr id="134" name="TextShape 2"/>
+          <p:cNvPr id="138" name="TextShape 2"/>
           <p:cNvSpPr txBox="1"/>
           <p:nvPr/>
         </p:nvSpPr>
@@ -7007,7 +7122,7 @@
                 <a:spcPct val="100000"/>
               </a:lnSpc>
             </a:pPr>
-            <a:fld id="{BED63340-6006-4421-9177-C897957E0957}" type="slidenum">
+            <a:fld id="{0AC9DC2D-F5D5-4F95-87AB-C36EB6A8A671}" type="slidenum">
               <a:rPr b="1" lang="en-US" sz="1300" spc="-1" strike="noStrike">
                 <a:solidFill>
                   <a:srgbClr val="ffffff"/>
@@ -7037,7 +7152,7 @@
       </p:sp>
       <p:sp>
         <p:nvSpPr>
-          <p:cNvPr id="135" name="TextShape 3"/>
+          <p:cNvPr id="139" name="TextShape 3"/>
           <p:cNvSpPr txBox="1"/>
           <p:nvPr/>
         </p:nvSpPr>
@@ -7098,7 +7213,7 @@
       </p:sp>
       <p:sp>
         <p:nvSpPr>
-          <p:cNvPr id="136" name="TextShape 4"/>
+          <p:cNvPr id="140" name="TextShape 4"/>
           <p:cNvSpPr txBox="1"/>
           <p:nvPr/>
         </p:nvSpPr>
@@ -7613,7 +7728,7 @@
       </p:grpSpPr>
       <p:sp>
         <p:nvSpPr>
-          <p:cNvPr id="137" name="TextShape 1"/>
+          <p:cNvPr id="141" name="TextShape 1"/>
           <p:cNvSpPr txBox="1"/>
           <p:nvPr/>
         </p:nvSpPr>
@@ -7668,7 +7783,7 @@
       </p:sp>
       <p:sp>
         <p:nvSpPr>
-          <p:cNvPr id="138" name="TextShape 2"/>
+          <p:cNvPr id="142" name="TextShape 2"/>
           <p:cNvSpPr txBox="1"/>
           <p:nvPr/>
         </p:nvSpPr>
@@ -7693,7 +7808,7 @@
                 <a:spcPct val="100000"/>
               </a:lnSpc>
             </a:pPr>
-            <a:fld id="{2F44170E-D77E-412A-A792-CD09A95BFB4C}" type="slidenum">
+            <a:fld id="{64FC139F-E0DA-4866-8A69-2BAEEBEA9919}" type="slidenum">
               <a:rPr b="1" lang="en-US" sz="1300" spc="-1" strike="noStrike">
                 <a:solidFill>
                   <a:srgbClr val="ffffff"/>
@@ -7723,7 +7838,7 @@
       </p:sp>
       <p:sp>
         <p:nvSpPr>
-          <p:cNvPr id="139" name="TextShape 3"/>
+          <p:cNvPr id="143" name="TextShape 3"/>
           <p:cNvSpPr txBox="1"/>
           <p:nvPr/>
         </p:nvSpPr>

</xml_diff>